<commit_message>
add USB image acqusition tutorial
</commit_message>
<xml_diff>
--- a/Illegal_Possession_Images/Rhion_Possession_2_Steganography.pptx
+++ b/Illegal_Possession_Images/Rhion_Possession_2_Steganography.pptx
@@ -5,7 +5,7 @@
     <p:sldMasterId id="2147483648" r:id="rId1"/>
   </p:sldMasterIdLst>
   <p:notesMasterIdLst>
-    <p:notesMasterId r:id="rId25"/>
+    <p:notesMasterId r:id="rId26"/>
   </p:notesMasterIdLst>
   <p:sldIdLst>
     <p:sldId id="256" r:id="rId2"/>
@@ -24,13 +24,14 @@
     <p:sldId id="390" r:id="rId15"/>
     <p:sldId id="387" r:id="rId16"/>
     <p:sldId id="388" r:id="rId17"/>
-    <p:sldId id="403" r:id="rId18"/>
-    <p:sldId id="402" r:id="rId19"/>
-    <p:sldId id="374" r:id="rId20"/>
-    <p:sldId id="399" r:id="rId21"/>
-    <p:sldId id="400" r:id="rId22"/>
-    <p:sldId id="401" r:id="rId23"/>
-    <p:sldId id="404" r:id="rId24"/>
+    <p:sldId id="405" r:id="rId18"/>
+    <p:sldId id="403" r:id="rId19"/>
+    <p:sldId id="402" r:id="rId20"/>
+    <p:sldId id="374" r:id="rId21"/>
+    <p:sldId id="399" r:id="rId22"/>
+    <p:sldId id="400" r:id="rId23"/>
+    <p:sldId id="401" r:id="rId24"/>
+    <p:sldId id="404" r:id="rId25"/>
   </p:sldIdLst>
   <p:sldSz cx="12192000" cy="6858000"/>
   <p:notesSz cx="6858000" cy="9144000"/>
@@ -137,6 +138,167 @@
 </p:presentation>
 </file>
 
+<file path=ppt/changesInfos/changesInfo1.xml><?xml version="1.0" encoding="utf-8"?>
+<pc:chgInfo xmlns:a="http://schemas.openxmlformats.org/drawingml/2006/main" xmlns:r="http://schemas.openxmlformats.org/officeDocument/2006/relationships" xmlns:ac="http://schemas.microsoft.com/office/drawing/2013/main/command" xmlns:pc="http://schemas.microsoft.com/office/powerpoint/2013/main/command">
+  <pc:docChgLst>
+    <pc:chgData name="Weifeng Xu" userId="e7aed605-a3dd-4d5a-a692-a87037af107b" providerId="ADAL" clId="{216DA3AF-6716-411D-B14D-8986F59D1840}"/>
+    <pc:docChg chg="undo custSel addSld modSld sldOrd">
+      <pc:chgData name="Weifeng Xu" userId="e7aed605-a3dd-4d5a-a692-a87037af107b" providerId="ADAL" clId="{216DA3AF-6716-411D-B14D-8986F59D1840}" dt="2021-04-29T22:59:42.453" v="401"/>
+      <pc:docMkLst>
+        <pc:docMk/>
+      </pc:docMkLst>
+      <pc:sldChg chg="modSp mod">
+        <pc:chgData name="Weifeng Xu" userId="e7aed605-a3dd-4d5a-a692-a87037af107b" providerId="ADAL" clId="{216DA3AF-6716-411D-B14D-8986F59D1840}" dt="2021-04-29T22:34:08.972" v="399" actId="20577"/>
+        <pc:sldMkLst>
+          <pc:docMk/>
+          <pc:sldMk cId="866400700" sldId="370"/>
+        </pc:sldMkLst>
+        <pc:spChg chg="mod">
+          <ac:chgData name="Weifeng Xu" userId="e7aed605-a3dd-4d5a-a692-a87037af107b" providerId="ADAL" clId="{216DA3AF-6716-411D-B14D-8986F59D1840}" dt="2021-04-29T22:34:08.972" v="399" actId="20577"/>
+          <ac:spMkLst>
+            <pc:docMk/>
+            <pc:sldMk cId="866400700" sldId="370"/>
+            <ac:spMk id="3" creationId="{00000000-0000-0000-0000-000000000000}"/>
+          </ac:spMkLst>
+        </pc:spChg>
+      </pc:sldChg>
+      <pc:sldChg chg="addSp delSp modSp new mod ord modClrScheme chgLayout">
+        <pc:chgData name="Weifeng Xu" userId="e7aed605-a3dd-4d5a-a692-a87037af107b" providerId="ADAL" clId="{216DA3AF-6716-411D-B14D-8986F59D1840}" dt="2021-04-29T22:59:42.453" v="401"/>
+        <pc:sldMkLst>
+          <pc:docMk/>
+          <pc:sldMk cId="650748944" sldId="405"/>
+        </pc:sldMkLst>
+        <pc:spChg chg="del mod ord">
+          <ac:chgData name="Weifeng Xu" userId="e7aed605-a3dd-4d5a-a692-a87037af107b" providerId="ADAL" clId="{216DA3AF-6716-411D-B14D-8986F59D1840}" dt="2021-04-22T18:51:02.951" v="1" actId="700"/>
+          <ac:spMkLst>
+            <pc:docMk/>
+            <pc:sldMk cId="650748944" sldId="405"/>
+            <ac:spMk id="2" creationId="{91BEF663-CFFD-45B2-A952-BFF72E9E01AF}"/>
+          </ac:spMkLst>
+        </pc:spChg>
+        <pc:spChg chg="del mod ord">
+          <ac:chgData name="Weifeng Xu" userId="e7aed605-a3dd-4d5a-a692-a87037af107b" providerId="ADAL" clId="{216DA3AF-6716-411D-B14D-8986F59D1840}" dt="2021-04-22T18:51:02.951" v="1" actId="700"/>
+          <ac:spMkLst>
+            <pc:docMk/>
+            <pc:sldMk cId="650748944" sldId="405"/>
+            <ac:spMk id="3" creationId="{97E3173C-C477-4CF4-92B9-816809E55621}"/>
+          </ac:spMkLst>
+        </pc:spChg>
+        <pc:spChg chg="add mod ord">
+          <ac:chgData name="Weifeng Xu" userId="e7aed605-a3dd-4d5a-a692-a87037af107b" providerId="ADAL" clId="{216DA3AF-6716-411D-B14D-8986F59D1840}" dt="2021-04-22T18:52:04.098" v="78" actId="21"/>
+          <ac:spMkLst>
+            <pc:docMk/>
+            <pc:sldMk cId="650748944" sldId="405"/>
+            <ac:spMk id="4" creationId="{D14BAF43-1D47-480F-9826-488B646E918B}"/>
+          </ac:spMkLst>
+        </pc:spChg>
+        <pc:spChg chg="add mod ord">
+          <ac:chgData name="Weifeng Xu" userId="e7aed605-a3dd-4d5a-a692-a87037af107b" providerId="ADAL" clId="{216DA3AF-6716-411D-B14D-8986F59D1840}" dt="2021-04-22T23:37:16.968" v="397" actId="20577"/>
+          <ac:spMkLst>
+            <pc:docMk/>
+            <pc:sldMk cId="650748944" sldId="405"/>
+            <ac:spMk id="5" creationId="{B0B60EF2-6757-465B-B92A-5D06FD527865}"/>
+          </ac:spMkLst>
+        </pc:spChg>
+      </pc:sldChg>
+    </pc:docChg>
+  </pc:docChgLst>
+  <pc:docChgLst>
+    <pc:chgData name="Weifeng Xu" userId="e7aed605-a3dd-4d5a-a692-a87037af107b" providerId="ADAL" clId="{146C1BD1-847B-4A20-B041-06CF84BCC62A}"/>
+    <pc:docChg chg="undo custSel modSld">
+      <pc:chgData name="Weifeng Xu" userId="e7aed605-a3dd-4d5a-a692-a87037af107b" providerId="ADAL" clId="{146C1BD1-847B-4A20-B041-06CF84BCC62A}" dt="2021-02-18T02:10:54.032" v="40" actId="1076"/>
+      <pc:docMkLst>
+        <pc:docMk/>
+      </pc:docMkLst>
+      <pc:sldChg chg="addSp modSp mod">
+        <pc:chgData name="Weifeng Xu" userId="e7aed605-a3dd-4d5a-a692-a87037af107b" providerId="ADAL" clId="{146C1BD1-847B-4A20-B041-06CF84BCC62A}" dt="2021-02-17T20:08:10.183" v="33" actId="1076"/>
+        <pc:sldMkLst>
+          <pc:docMk/>
+          <pc:sldMk cId="1746117277" sldId="366"/>
+        </pc:sldMkLst>
+        <pc:spChg chg="mod">
+          <ac:chgData name="Weifeng Xu" userId="e7aed605-a3dd-4d5a-a692-a87037af107b" providerId="ADAL" clId="{146C1BD1-847B-4A20-B041-06CF84BCC62A}" dt="2021-02-17T20:08:03.835" v="32" actId="1036"/>
+          <ac:spMkLst>
+            <pc:docMk/>
+            <pc:sldMk cId="1746117277" sldId="366"/>
+            <ac:spMk id="8" creationId="{00000000-0000-0000-0000-000000000000}"/>
+          </ac:spMkLst>
+        </pc:spChg>
+        <pc:spChg chg="mod">
+          <ac:chgData name="Weifeng Xu" userId="e7aed605-a3dd-4d5a-a692-a87037af107b" providerId="ADAL" clId="{146C1BD1-847B-4A20-B041-06CF84BCC62A}" dt="2021-02-17T20:08:03.835" v="32" actId="1036"/>
+          <ac:spMkLst>
+            <pc:docMk/>
+            <pc:sldMk cId="1746117277" sldId="366"/>
+            <ac:spMk id="9" creationId="{00000000-0000-0000-0000-000000000000}"/>
+          </ac:spMkLst>
+        </pc:spChg>
+        <pc:picChg chg="mod">
+          <ac:chgData name="Weifeng Xu" userId="e7aed605-a3dd-4d5a-a692-a87037af107b" providerId="ADAL" clId="{146C1BD1-847B-4A20-B041-06CF84BCC62A}" dt="2021-02-17T20:08:03.835" v="32" actId="1036"/>
+          <ac:picMkLst>
+            <pc:docMk/>
+            <pc:sldMk cId="1746117277" sldId="366"/>
+            <ac:picMk id="5" creationId="{00000000-0000-0000-0000-000000000000}"/>
+          </ac:picMkLst>
+        </pc:picChg>
+        <pc:picChg chg="add mod">
+          <ac:chgData name="Weifeng Xu" userId="e7aed605-a3dd-4d5a-a692-a87037af107b" providerId="ADAL" clId="{146C1BD1-847B-4A20-B041-06CF84BCC62A}" dt="2021-02-17T20:08:10.183" v="33" actId="1076"/>
+          <ac:picMkLst>
+            <pc:docMk/>
+            <pc:sldMk cId="1746117277" sldId="366"/>
+            <ac:picMk id="10" creationId="{7F12E880-8720-49D0-B45A-A0024F12CB53}"/>
+          </ac:picMkLst>
+        </pc:picChg>
+      </pc:sldChg>
+      <pc:sldChg chg="addSp delSp modSp mod">
+        <pc:chgData name="Weifeng Xu" userId="e7aed605-a3dd-4d5a-a692-a87037af107b" providerId="ADAL" clId="{146C1BD1-847B-4A20-B041-06CF84BCC62A}" dt="2021-02-17T20:07:26.301" v="2" actId="478"/>
+        <pc:sldMkLst>
+          <pc:docMk/>
+          <pc:sldMk cId="3016990123" sldId="369"/>
+        </pc:sldMkLst>
+        <pc:picChg chg="add del mod">
+          <ac:chgData name="Weifeng Xu" userId="e7aed605-a3dd-4d5a-a692-a87037af107b" providerId="ADAL" clId="{146C1BD1-847B-4A20-B041-06CF84BCC62A}" dt="2021-02-17T20:07:26.301" v="2" actId="478"/>
+          <ac:picMkLst>
+            <pc:docMk/>
+            <pc:sldMk cId="3016990123" sldId="369"/>
+            <ac:picMk id="7" creationId="{DF08932E-D5EA-419F-AD18-21610469894C}"/>
+          </ac:picMkLst>
+        </pc:picChg>
+      </pc:sldChg>
+      <pc:sldChg chg="addSp modSp mod">
+        <pc:chgData name="Weifeng Xu" userId="e7aed605-a3dd-4d5a-a692-a87037af107b" providerId="ADAL" clId="{146C1BD1-847B-4A20-B041-06CF84BCC62A}" dt="2021-02-18T01:44:23.807" v="37" actId="1076"/>
+        <pc:sldMkLst>
+          <pc:docMk/>
+          <pc:sldMk cId="1586672900" sldId="387"/>
+        </pc:sldMkLst>
+        <pc:spChg chg="add mod">
+          <ac:chgData name="Weifeng Xu" userId="e7aed605-a3dd-4d5a-a692-a87037af107b" providerId="ADAL" clId="{146C1BD1-847B-4A20-B041-06CF84BCC62A}" dt="2021-02-18T01:44:23.807" v="37" actId="1076"/>
+          <ac:spMkLst>
+            <pc:docMk/>
+            <pc:sldMk cId="1586672900" sldId="387"/>
+            <ac:spMk id="12" creationId="{5D400A00-2832-4A43-9AC0-3EBA866BFB4C}"/>
+          </ac:spMkLst>
+        </pc:spChg>
+      </pc:sldChg>
+      <pc:sldChg chg="addSp modSp mod">
+        <pc:chgData name="Weifeng Xu" userId="e7aed605-a3dd-4d5a-a692-a87037af107b" providerId="ADAL" clId="{146C1BD1-847B-4A20-B041-06CF84BCC62A}" dt="2021-02-18T02:10:54.032" v="40" actId="1076"/>
+        <pc:sldMkLst>
+          <pc:docMk/>
+          <pc:sldMk cId="3730679358" sldId="388"/>
+        </pc:sldMkLst>
+        <pc:spChg chg="add mod">
+          <ac:chgData name="Weifeng Xu" userId="e7aed605-a3dd-4d5a-a692-a87037af107b" providerId="ADAL" clId="{146C1BD1-847B-4A20-B041-06CF84BCC62A}" dt="2021-02-18T02:10:54.032" v="40" actId="1076"/>
+          <ac:spMkLst>
+            <pc:docMk/>
+            <pc:sldMk cId="3730679358" sldId="388"/>
+            <ac:spMk id="11" creationId="{BE527AFF-692A-4C55-B014-2225D3C34EC5}"/>
+          </ac:spMkLst>
+        </pc:spChg>
+      </pc:sldChg>
+    </pc:docChg>
+  </pc:docChgLst>
+</pc:chgInfo>
+</file>
+
 <file path=ppt/notesMasters/notesMaster1.xml><?xml version="1.0" encoding="utf-8"?>
 <p:notesMaster xmlns:a="http://schemas.openxmlformats.org/drawingml/2006/main" xmlns:r="http://schemas.openxmlformats.org/officeDocument/2006/relationships" xmlns:p="http://schemas.openxmlformats.org/presentationml/2006/main">
   <p:cSld>
@@ -219,7 +381,7 @@
           <a:p>
             <a:fld id="{EE41F6E3-57F9-402E-BDBA-5B2DE11C8530}" type="datetimeFigureOut">
               <a:rPr lang="en-US" smtClean="0"/>
-              <a:t>11/9/2020</a:t>
+              <a:t>4/29/2021</a:t>
             </a:fld>
             <a:endParaRPr lang="en-US"/>
           </a:p>
@@ -283,38 +445,37 @@
           <a:p>
             <a:pPr lvl="0"/>
             <a:r>
-              <a:rPr lang="en-US" smtClean="0"/>
+              <a:rPr lang="en-US"/>
               <a:t>Click to edit Master text styles</a:t>
             </a:r>
           </a:p>
           <a:p>
             <a:pPr lvl="1"/>
             <a:r>
-              <a:rPr lang="en-US" smtClean="0"/>
+              <a:rPr lang="en-US"/>
               <a:t>Second level</a:t>
             </a:r>
           </a:p>
           <a:p>
             <a:pPr lvl="2"/>
             <a:r>
-              <a:rPr lang="en-US" smtClean="0"/>
+              <a:rPr lang="en-US"/>
               <a:t>Third level</a:t>
             </a:r>
           </a:p>
           <a:p>
             <a:pPr lvl="3"/>
             <a:r>
-              <a:rPr lang="en-US" smtClean="0"/>
+              <a:rPr lang="en-US"/>
               <a:t>Fourth level</a:t>
             </a:r>
           </a:p>
           <a:p>
             <a:pPr lvl="4"/>
             <a:r>
-              <a:rPr lang="en-US" smtClean="0"/>
+              <a:rPr lang="en-US"/>
               <a:t>Fifth level</a:t>
             </a:r>
-            <a:endParaRPr lang="en-US"/>
           </a:p>
         </p:txBody>
       </p:sp>
@@ -532,10 +693,9 @@
           <a:lstStyle/>
           <a:p>
             <a:r>
-              <a:rPr lang="en-US" dirty="0" smtClean="0"/>
+              <a:rPr lang="en-US" dirty="0"/>
               <a:t>https://www.youtube.com/watch?v=6G3qm60dfA8&amp;ab_channel=PrashantThombre</a:t>
             </a:r>
-            <a:endParaRPr lang="en-US" dirty="0"/>
           </a:p>
         </p:txBody>
       </p:sp>
@@ -620,10 +780,9 @@
           <a:lstStyle/>
           <a:p>
             <a:r>
-              <a:rPr lang="en-US" dirty="0" smtClean="0"/>
+              <a:rPr lang="en-US" dirty="0"/>
               <a:t>https://linux.die.net/man/1/stegdetect#:~:text=The%20stegdetect%20utility%20analyses%20image,to%20embed%20the%20hidden%20information.</a:t>
             </a:r>
-            <a:endParaRPr lang="en-US" dirty="0"/>
           </a:p>
         </p:txBody>
       </p:sp>
@@ -707,131 +866,7 @@
           <a:bodyPr/>
           <a:lstStyle/>
           <a:p>
-            <a:r>
-              <a:rPr lang="en-US" dirty="0" smtClean="0"/>
-              <a:t>$ </a:t>
-            </a:r>
-            <a:r>
-              <a:rPr lang="en-US" b="1" dirty="0" err="1" smtClean="0"/>
-              <a:t>git</a:t>
-            </a:r>
-            <a:r>
-              <a:rPr lang="en-US" b="1" dirty="0" smtClean="0"/>
-              <a:t> clone https://github.com/poizan42/stegdetect</a:t>
-            </a:r>
-            <a:endParaRPr lang="en-US" dirty="0" smtClean="0"/>
-          </a:p>
-          <a:p>
-            <a:r>
-              <a:rPr lang="en-US" dirty="0" smtClean="0"/>
-              <a:t>$ </a:t>
-            </a:r>
-            <a:r>
-              <a:rPr lang="en-US" b="1" dirty="0" smtClean="0"/>
-              <a:t>cd </a:t>
-            </a:r>
-            <a:r>
-              <a:rPr lang="en-US" b="1" dirty="0" err="1" smtClean="0"/>
-              <a:t>stegdetect</a:t>
-            </a:r>
-            <a:r>
-              <a:rPr lang="en-US" b="1" dirty="0" smtClean="0"/>
-              <a:t>/</a:t>
-            </a:r>
-            <a:r>
-              <a:rPr lang="en-US" dirty="0" smtClean="0"/>
-              <a:t> </a:t>
-            </a:r>
-          </a:p>
-          <a:p>
-            <a:r>
-              <a:rPr lang="en-US" sz="1200" b="0" i="0" kern="1200" dirty="0" smtClean="0">
-                <a:solidFill>
-                  <a:schemeClr val="tx1"/>
-                </a:solidFill>
-                <a:effectLst/>
-                <a:latin typeface="+mn-lt"/>
-                <a:ea typeface="+mn-ea"/>
-                <a:cs typeface="+mn-cs"/>
-              </a:rPr>
-              <a:t>$ </a:t>
-            </a:r>
-            <a:r>
-              <a:rPr lang="en-US" sz="1200" b="0" i="0" kern="1200" dirty="0" err="1" smtClean="0">
-                <a:solidFill>
-                  <a:schemeClr val="tx1"/>
-                </a:solidFill>
-                <a:effectLst/>
-                <a:latin typeface="+mn-lt"/>
-                <a:ea typeface="+mn-ea"/>
-                <a:cs typeface="+mn-cs"/>
-              </a:rPr>
-              <a:t>autoreconf</a:t>
-            </a:r>
-            <a:r>
-              <a:rPr lang="en-US" sz="1200" b="0" i="0" kern="1200" dirty="0" smtClean="0">
-                <a:solidFill>
-                  <a:schemeClr val="tx1"/>
-                </a:solidFill>
-                <a:effectLst/>
-                <a:latin typeface="+mn-lt"/>
-                <a:ea typeface="+mn-ea"/>
-                <a:cs typeface="+mn-cs"/>
-              </a:rPr>
-              <a:t> -f -</a:t>
-            </a:r>
-            <a:r>
-              <a:rPr lang="en-US" sz="1200" b="0" i="0" kern="1200" dirty="0" err="1" smtClean="0">
-                <a:solidFill>
-                  <a:schemeClr val="tx1"/>
-                </a:solidFill>
-                <a:effectLst/>
-                <a:latin typeface="+mn-lt"/>
-                <a:ea typeface="+mn-ea"/>
-                <a:cs typeface="+mn-cs"/>
-              </a:rPr>
-              <a:t>i</a:t>
-            </a:r>
-            <a:endParaRPr lang="en-US" dirty="0" smtClean="0"/>
-          </a:p>
-          <a:p>
-            <a:r>
-              <a:rPr lang="en-US" dirty="0" smtClean="0"/>
-              <a:t>$ </a:t>
-            </a:r>
-            <a:r>
-              <a:rPr lang="en-US" b="1" dirty="0" smtClean="0"/>
-              <a:t>linux32 ./configure</a:t>
-            </a:r>
-            <a:r>
-              <a:rPr lang="en-US" dirty="0" smtClean="0"/>
-              <a:t> </a:t>
-            </a:r>
-          </a:p>
-          <a:p>
-            <a:r>
-              <a:rPr lang="en-US" dirty="0" smtClean="0"/>
-              <a:t>$ </a:t>
-            </a:r>
-            <a:r>
-              <a:rPr lang="en-US" b="1" dirty="0" smtClean="0"/>
-              <a:t>linux32 make</a:t>
-            </a:r>
-          </a:p>
-          <a:p>
-            <a:endParaRPr lang="en-US" b="1" dirty="0" smtClean="0"/>
-          </a:p>
-          <a:p>
-            <a:r>
-              <a:rPr lang="en-US" dirty="0" smtClean="0"/>
-              <a:t>https://stackoverflow.com/questions/33278928/how-to-overcome-aclocal-1-15-is-missing-on-your-system-warning</a:t>
-            </a:r>
-          </a:p>
-          <a:p>
-            <a:r>
-              <a:rPr lang="en-US" dirty="0" smtClean="0"/>
-              <a:t>https://www.geeksforgeeks.org/autoreconf-command-in-linux-with-examples/</a:t>
-            </a:r>
+            <a:endParaRPr lang="en-US" dirty="0"/>
           </a:p>
         </p:txBody>
       </p:sp>
@@ -842,7 +877,7 @@
             <a:spLocks noGrp="1"/>
           </p:cNvSpPr>
           <p:nvPr>
-            <p:ph type="sldNum" sz="quarter" idx="10"/>
+            <p:ph type="sldNum" sz="quarter" idx="5"/>
           </p:nvPr>
         </p:nvSpPr>
         <p:spPr/>
@@ -852,7 +887,7 @@
           <a:p>
             <a:fld id="{DDBF98C7-164A-4723-84F0-B1E4B080DDEC}" type="slidenum">
               <a:rPr lang="en-US" smtClean="0"/>
-              <a:t>7</a:t>
+              <a:t>5</a:t>
             </a:fld>
             <a:endParaRPr lang="en-US"/>
           </a:p>
@@ -861,7 +896,7 @@
     </p:spTree>
     <p:extLst>
       <p:ext uri="{BB962C8B-B14F-4D97-AF65-F5344CB8AC3E}">
-        <p14:creationId xmlns:p14="http://schemas.microsoft.com/office/powerpoint/2010/main" val="1367154402"/>
+        <p14:creationId xmlns:p14="http://schemas.microsoft.com/office/powerpoint/2010/main" val="3639089410"/>
       </p:ext>
     </p:extLst>
   </p:cSld>
@@ -916,10 +951,130 @@
           <a:lstStyle/>
           <a:p>
             <a:r>
-              <a:rPr lang="en-US" dirty="0" smtClean="0"/>
-              <a:t>https://linux.die.net/man/1/stegdetect#:~:text=The%20stegdetect%20utility%20analyses%20image,to%20embed%20the%20hidden%20information.</a:t>
+              <a:rPr lang="en-US" dirty="0"/>
+              <a:t>$ </a:t>
+            </a:r>
+            <a:r>
+              <a:rPr lang="en-US" b="1" dirty="0" err="1"/>
+              <a:t>git</a:t>
+            </a:r>
+            <a:r>
+              <a:rPr lang="en-US" b="1" dirty="0"/>
+              <a:t> clone https://github.com/poizan42/stegdetect</a:t>
             </a:r>
             <a:endParaRPr lang="en-US" dirty="0"/>
+          </a:p>
+          <a:p>
+            <a:r>
+              <a:rPr lang="en-US" dirty="0"/>
+              <a:t>$ </a:t>
+            </a:r>
+            <a:r>
+              <a:rPr lang="en-US" b="1" dirty="0"/>
+              <a:t>cd </a:t>
+            </a:r>
+            <a:r>
+              <a:rPr lang="en-US" b="1" dirty="0" err="1"/>
+              <a:t>stegdetect</a:t>
+            </a:r>
+            <a:r>
+              <a:rPr lang="en-US" b="1" dirty="0"/>
+              <a:t>/</a:t>
+            </a:r>
+            <a:r>
+              <a:rPr lang="en-US" dirty="0"/>
+              <a:t> </a:t>
+            </a:r>
+          </a:p>
+          <a:p>
+            <a:r>
+              <a:rPr lang="en-US" sz="1200" b="0" i="0" kern="1200" dirty="0">
+                <a:solidFill>
+                  <a:schemeClr val="tx1"/>
+                </a:solidFill>
+                <a:effectLst/>
+                <a:latin typeface="+mn-lt"/>
+                <a:ea typeface="+mn-ea"/>
+                <a:cs typeface="+mn-cs"/>
+              </a:rPr>
+              <a:t>$ </a:t>
+            </a:r>
+            <a:r>
+              <a:rPr lang="en-US" sz="1200" b="0" i="0" kern="1200" dirty="0" err="1">
+                <a:solidFill>
+                  <a:schemeClr val="tx1"/>
+                </a:solidFill>
+                <a:effectLst/>
+                <a:latin typeface="+mn-lt"/>
+                <a:ea typeface="+mn-ea"/>
+                <a:cs typeface="+mn-cs"/>
+              </a:rPr>
+              <a:t>autoreconf</a:t>
+            </a:r>
+            <a:r>
+              <a:rPr lang="en-US" sz="1200" b="0" i="0" kern="1200" dirty="0">
+                <a:solidFill>
+                  <a:schemeClr val="tx1"/>
+                </a:solidFill>
+                <a:effectLst/>
+                <a:latin typeface="+mn-lt"/>
+                <a:ea typeface="+mn-ea"/>
+                <a:cs typeface="+mn-cs"/>
+              </a:rPr>
+              <a:t> -f -</a:t>
+            </a:r>
+            <a:r>
+              <a:rPr lang="en-US" sz="1200" b="0" i="0" kern="1200" dirty="0" err="1">
+                <a:solidFill>
+                  <a:schemeClr val="tx1"/>
+                </a:solidFill>
+                <a:effectLst/>
+                <a:latin typeface="+mn-lt"/>
+                <a:ea typeface="+mn-ea"/>
+                <a:cs typeface="+mn-cs"/>
+              </a:rPr>
+              <a:t>i</a:t>
+            </a:r>
+            <a:endParaRPr lang="en-US" dirty="0"/>
+          </a:p>
+          <a:p>
+            <a:r>
+              <a:rPr lang="en-US" dirty="0"/>
+              <a:t>$ </a:t>
+            </a:r>
+            <a:r>
+              <a:rPr lang="en-US" b="1" dirty="0"/>
+              <a:t>linux32 ./configure</a:t>
+            </a:r>
+            <a:r>
+              <a:rPr lang="en-US" dirty="0"/>
+              <a:t> </a:t>
+            </a:r>
+          </a:p>
+          <a:p>
+            <a:r>
+              <a:rPr lang="en-US" dirty="0"/>
+              <a:t>$ </a:t>
+            </a:r>
+            <a:r>
+              <a:rPr lang="en-US" b="1" dirty="0"/>
+              <a:t>linux32 make</a:t>
+            </a:r>
+          </a:p>
+          <a:p>
+            <a:endParaRPr lang="en-US" b="1" dirty="0"/>
+          </a:p>
+          <a:p>
+            <a:r>
+              <a:rPr lang="en-US" dirty="0"/>
+              <a:t>https://stackoverflow.com/questions/33278928/how-to-overcome-aclocal-1-15-is-missing-on-your-system-warning</a:t>
+            </a:r>
+          </a:p>
+          <a:p>
+            <a:r>
+              <a:rPr lang="en-US" dirty="0"/>
+              <a:t>https://www.geeksforgeeks.org/autoreconf-command-in-linux-with-examples/</a:t>
+            </a:r>
           </a:p>
         </p:txBody>
       </p:sp>
@@ -940,7 +1095,7 @@
           <a:p>
             <a:fld id="{DDBF98C7-164A-4723-84F0-B1E4B080DDEC}" type="slidenum">
               <a:rPr lang="en-US" smtClean="0"/>
-              <a:t>9</a:t>
+              <a:t>7</a:t>
             </a:fld>
             <a:endParaRPr lang="en-US"/>
           </a:p>
@@ -949,7 +1104,7 @@
     </p:spTree>
     <p:extLst>
       <p:ext uri="{BB962C8B-B14F-4D97-AF65-F5344CB8AC3E}">
-        <p14:creationId xmlns:p14="http://schemas.microsoft.com/office/powerpoint/2010/main" val="4072676867"/>
+        <p14:creationId xmlns:p14="http://schemas.microsoft.com/office/powerpoint/2010/main" val="1367154402"/>
       </p:ext>
     </p:extLst>
   </p:cSld>
@@ -1004,14 +1159,9 @@
           <a:lstStyle/>
           <a:p>
             <a:r>
-              <a:rPr lang="en-US" dirty="0" err="1" smtClean="0"/>
-              <a:t>wget</a:t>
-            </a:r>
-            <a:r>
-              <a:rPr lang="en-US" dirty="0" smtClean="0"/>
-              <a:t> –q https://github.com/brannondorsey/naive-hashcat/releases/download/data/rockyou.txt</a:t>
-            </a:r>
-            <a:endParaRPr lang="en-US" dirty="0"/>
+              <a:rPr lang="en-US" dirty="0"/>
+              <a:t>https://linux.die.net/man/1/stegdetect#:~:text=The%20stegdetect%20utility%20analyses%20image,to%20embed%20the%20hidden%20information.</a:t>
+            </a:r>
           </a:p>
         </p:txBody>
       </p:sp>
@@ -1032,7 +1182,7 @@
           <a:p>
             <a:fld id="{DDBF98C7-164A-4723-84F0-B1E4B080DDEC}" type="slidenum">
               <a:rPr lang="en-US" smtClean="0"/>
-              <a:t>13</a:t>
+              <a:t>9</a:t>
             </a:fld>
             <a:endParaRPr lang="en-US"/>
           </a:p>
@@ -1041,7 +1191,7 @@
     </p:spTree>
     <p:extLst>
       <p:ext uri="{BB962C8B-B14F-4D97-AF65-F5344CB8AC3E}">
-        <p14:creationId xmlns:p14="http://schemas.microsoft.com/office/powerpoint/2010/main" val="2263556427"/>
+        <p14:creationId xmlns:p14="http://schemas.microsoft.com/office/powerpoint/2010/main" val="4072676867"/>
       </p:ext>
     </p:extLst>
   </p:cSld>
@@ -1096,10 +1246,13 @@
           <a:lstStyle/>
           <a:p>
             <a:r>
-              <a:rPr lang="en-US" dirty="0" smtClean="0"/>
-              <a:t>https://github.com/DominicBreuker/stego-toolkit#tools</a:t>
-            </a:r>
-            <a:endParaRPr lang="en-US" dirty="0"/>
+              <a:rPr lang="en-US" dirty="0" err="1"/>
+              <a:t>wget</a:t>
+            </a:r>
+            <a:r>
+              <a:rPr lang="en-US" dirty="0"/>
+              <a:t> –q https://github.com/brannondorsey/naive-hashcat/releases/download/data/rockyou.txt</a:t>
+            </a:r>
           </a:p>
         </p:txBody>
       </p:sp>
@@ -1120,7 +1273,7 @@
           <a:p>
             <a:fld id="{DDBF98C7-164A-4723-84F0-B1E4B080DDEC}" type="slidenum">
               <a:rPr lang="en-US" smtClean="0"/>
-              <a:t>18</a:t>
+              <a:t>13</a:t>
             </a:fld>
             <a:endParaRPr lang="en-US"/>
           </a:p>
@@ -1129,7 +1282,7 @@
     </p:spTree>
     <p:extLst>
       <p:ext uri="{BB962C8B-B14F-4D97-AF65-F5344CB8AC3E}">
-        <p14:creationId xmlns:p14="http://schemas.microsoft.com/office/powerpoint/2010/main" val="2156196350"/>
+        <p14:creationId xmlns:p14="http://schemas.microsoft.com/office/powerpoint/2010/main" val="2263556427"/>
       </p:ext>
     </p:extLst>
   </p:cSld>
@@ -1184,10 +1337,9 @@
           <a:lstStyle/>
           <a:p>
             <a:r>
-              <a:rPr lang="en-US" dirty="0" smtClean="0"/>
-              <a:t>https://www.prodefence.org/stego-toolkit-collection-of-steganography-tools-helps-with-ctf-challenges/</a:t>
-            </a:r>
-            <a:endParaRPr lang="en-US" dirty="0"/>
+              <a:rPr lang="en-US" dirty="0"/>
+              <a:t>https://github.com/DominicBreuker/stego-toolkit#tools</a:t>
+            </a:r>
           </a:p>
         </p:txBody>
       </p:sp>
@@ -1217,7 +1369,7 @@
     </p:spTree>
     <p:extLst>
       <p:ext uri="{BB962C8B-B14F-4D97-AF65-F5344CB8AC3E}">
-        <p14:creationId xmlns:p14="http://schemas.microsoft.com/office/powerpoint/2010/main" val="2361452719"/>
+        <p14:creationId xmlns:p14="http://schemas.microsoft.com/office/powerpoint/2010/main" val="2156196350"/>
       </p:ext>
     </p:extLst>
   </p:cSld>
@@ -1272,94 +1424,9 @@
           <a:lstStyle/>
           <a:p>
             <a:r>
-              <a:rPr lang="en-US" dirty="0" smtClean="0"/>
-              <a:t>github.com/</a:t>
-            </a:r>
-            <a:r>
-              <a:rPr lang="en-US" dirty="0" err="1" smtClean="0"/>
-              <a:t>DominicBreuker</a:t>
-            </a:r>
-            <a:r>
-              <a:rPr lang="en-US" dirty="0" smtClean="0"/>
-              <a:t>/</a:t>
-            </a:r>
-            <a:r>
-              <a:rPr lang="en-US" dirty="0" err="1" smtClean="0"/>
-              <a:t>stego</a:t>
-            </a:r>
-            <a:r>
-              <a:rPr lang="en-US" dirty="0" smtClean="0"/>
-              <a:t>-toolkit</a:t>
-            </a:r>
-          </a:p>
-          <a:p>
-            <a:r>
-              <a:rPr lang="en-US" dirty="0" err="1" smtClean="0"/>
-              <a:t>sudo</a:t>
-            </a:r>
-            <a:r>
-              <a:rPr lang="en-US" dirty="0" smtClean="0"/>
-              <a:t> apt-get update</a:t>
-            </a:r>
-          </a:p>
-          <a:p>
-            <a:r>
-              <a:rPr lang="en-US" dirty="0" err="1" smtClean="0"/>
-              <a:t>sudo</a:t>
-            </a:r>
-            <a:r>
-              <a:rPr lang="en-US" dirty="0" smtClean="0"/>
-              <a:t> </a:t>
-            </a:r>
-            <a:r>
-              <a:rPr lang="en-US" dirty="0" err="1" smtClean="0"/>
-              <a:t>git</a:t>
-            </a:r>
-            <a:r>
-              <a:rPr lang="en-US" dirty="0" smtClean="0"/>
-              <a:t> clone https://github.com/DominicBreuker/stego-toolkit.git</a:t>
-            </a:r>
-          </a:p>
-          <a:p>
-            <a:r>
-              <a:rPr lang="en-US" dirty="0" smtClean="0"/>
-              <a:t>cd </a:t>
-            </a:r>
-            <a:r>
-              <a:rPr lang="en-US" dirty="0" err="1" smtClean="0"/>
-              <a:t>stego</a:t>
-            </a:r>
-            <a:r>
-              <a:rPr lang="en-US" dirty="0" smtClean="0"/>
-              <a:t>-toolkit</a:t>
-            </a:r>
-          </a:p>
-          <a:p>
-            <a:r>
-              <a:rPr lang="en-US" dirty="0" smtClean="0"/>
-              <a:t>cd install</a:t>
-            </a:r>
-          </a:p>
-          <a:p>
-            <a:r>
-              <a:rPr lang="en-US" dirty="0" err="1" smtClean="0"/>
-              <a:t>chmod</a:t>
-            </a:r>
-            <a:r>
-              <a:rPr lang="en-US" dirty="0" smtClean="0"/>
-              <a:t> +x jphide.sh</a:t>
-            </a:r>
-          </a:p>
-          <a:p>
-            <a:r>
-              <a:rPr lang="en-US" dirty="0" err="1" smtClean="0"/>
-              <a:t>sudo</a:t>
-            </a:r>
-            <a:r>
-              <a:rPr lang="en-US" dirty="0" smtClean="0"/>
-              <a:t> ./jphide.sh</a:t>
-            </a:r>
-            <a:endParaRPr lang="en-US" dirty="0"/>
+              <a:rPr lang="en-US" dirty="0"/>
+              <a:t>https://www.prodefence.org/stego-toolkit-collection-of-steganography-tools-helps-with-ctf-challenges/</a:t>
+            </a:r>
           </a:p>
         </p:txBody>
       </p:sp>
@@ -1381,6 +1448,177 @@
             <a:fld id="{DDBF98C7-164A-4723-84F0-B1E4B080DDEC}" type="slidenum">
               <a:rPr lang="en-US" smtClean="0"/>
               <a:t>20</a:t>
+            </a:fld>
+            <a:endParaRPr lang="en-US"/>
+          </a:p>
+        </p:txBody>
+      </p:sp>
+    </p:spTree>
+    <p:extLst>
+      <p:ext uri="{BB962C8B-B14F-4D97-AF65-F5344CB8AC3E}">
+        <p14:creationId xmlns:p14="http://schemas.microsoft.com/office/powerpoint/2010/main" val="2361452719"/>
+      </p:ext>
+    </p:extLst>
+  </p:cSld>
+  <p:clrMapOvr>
+    <a:masterClrMapping/>
+  </p:clrMapOvr>
+</p:notes>
+</file>
+
+<file path=ppt/notesSlides/notesSlide9.xml><?xml version="1.0" encoding="utf-8"?>
+<p:notes xmlns:a="http://schemas.openxmlformats.org/drawingml/2006/main" xmlns:r="http://schemas.openxmlformats.org/officeDocument/2006/relationships" xmlns:p="http://schemas.openxmlformats.org/presentationml/2006/main">
+  <p:cSld>
+    <p:spTree>
+      <p:nvGrpSpPr>
+        <p:cNvPr id="1" name=""/>
+        <p:cNvGrpSpPr/>
+        <p:nvPr/>
+      </p:nvGrpSpPr>
+      <p:grpSpPr>
+        <a:xfrm>
+          <a:off x="0" y="0"/>
+          <a:ext cx="0" cy="0"/>
+          <a:chOff x="0" y="0"/>
+          <a:chExt cx="0" cy="0"/>
+        </a:xfrm>
+      </p:grpSpPr>
+      <p:sp>
+        <p:nvSpPr>
+          <p:cNvPr id="2" name="Slide Image Placeholder 1"/>
+          <p:cNvSpPr>
+            <a:spLocks noGrp="1" noRot="1" noChangeAspect="1"/>
+          </p:cNvSpPr>
+          <p:nvPr>
+            <p:ph type="sldImg"/>
+          </p:nvPr>
+        </p:nvSpPr>
+        <p:spPr/>
+      </p:sp>
+      <p:sp>
+        <p:nvSpPr>
+          <p:cNvPr id="3" name="Notes Placeholder 2"/>
+          <p:cNvSpPr>
+            <a:spLocks noGrp="1"/>
+          </p:cNvSpPr>
+          <p:nvPr>
+            <p:ph type="body" idx="1"/>
+          </p:nvPr>
+        </p:nvSpPr>
+        <p:spPr/>
+        <p:txBody>
+          <a:bodyPr/>
+          <a:lstStyle/>
+          <a:p>
+            <a:r>
+              <a:rPr lang="en-US" dirty="0"/>
+              <a:t>github.com/</a:t>
+            </a:r>
+            <a:r>
+              <a:rPr lang="en-US" dirty="0" err="1"/>
+              <a:t>DominicBreuker</a:t>
+            </a:r>
+            <a:r>
+              <a:rPr lang="en-US" dirty="0"/>
+              <a:t>/</a:t>
+            </a:r>
+            <a:r>
+              <a:rPr lang="en-US" dirty="0" err="1"/>
+              <a:t>stego</a:t>
+            </a:r>
+            <a:r>
+              <a:rPr lang="en-US" dirty="0"/>
+              <a:t>-toolkit</a:t>
+            </a:r>
+          </a:p>
+          <a:p>
+            <a:r>
+              <a:rPr lang="en-US" dirty="0" err="1"/>
+              <a:t>sudo</a:t>
+            </a:r>
+            <a:r>
+              <a:rPr lang="en-US" dirty="0"/>
+              <a:t> apt-get update</a:t>
+            </a:r>
+          </a:p>
+          <a:p>
+            <a:r>
+              <a:rPr lang="en-US" dirty="0" err="1"/>
+              <a:t>sudo</a:t>
+            </a:r>
+            <a:r>
+              <a:rPr lang="en-US" dirty="0"/>
+              <a:t> </a:t>
+            </a:r>
+            <a:r>
+              <a:rPr lang="en-US" dirty="0" err="1"/>
+              <a:t>git</a:t>
+            </a:r>
+            <a:r>
+              <a:rPr lang="en-US" dirty="0"/>
+              <a:t> clone https://github.com/DominicBreuker/stego-toolkit.git</a:t>
+            </a:r>
+          </a:p>
+          <a:p>
+            <a:r>
+              <a:rPr lang="en-US" dirty="0"/>
+              <a:t>cd </a:t>
+            </a:r>
+            <a:r>
+              <a:rPr lang="en-US" dirty="0" err="1"/>
+              <a:t>stego</a:t>
+            </a:r>
+            <a:r>
+              <a:rPr lang="en-US" dirty="0"/>
+              <a:t>-toolkit</a:t>
+            </a:r>
+          </a:p>
+          <a:p>
+            <a:r>
+              <a:rPr lang="en-US" dirty="0"/>
+              <a:t>cd install</a:t>
+            </a:r>
+          </a:p>
+          <a:p>
+            <a:r>
+              <a:rPr lang="en-US" dirty="0" err="1"/>
+              <a:t>chmod</a:t>
+            </a:r>
+            <a:r>
+              <a:rPr lang="en-US" dirty="0"/>
+              <a:t> +x jphide.sh</a:t>
+            </a:r>
+          </a:p>
+          <a:p>
+            <a:r>
+              <a:rPr lang="en-US" dirty="0" err="1"/>
+              <a:t>sudo</a:t>
+            </a:r>
+            <a:r>
+              <a:rPr lang="en-US" dirty="0"/>
+              <a:t> ./jphide.sh</a:t>
+            </a:r>
+          </a:p>
+        </p:txBody>
+      </p:sp>
+      <p:sp>
+        <p:nvSpPr>
+          <p:cNvPr id="4" name="Slide Number Placeholder 3"/>
+          <p:cNvSpPr>
+            <a:spLocks noGrp="1"/>
+          </p:cNvSpPr>
+          <p:nvPr>
+            <p:ph type="sldNum" sz="quarter" idx="10"/>
+          </p:nvPr>
+        </p:nvSpPr>
+        <p:spPr/>
+        <p:txBody>
+          <a:bodyPr/>
+          <a:lstStyle/>
+          <a:p>
+            <a:fld id="{DDBF98C7-164A-4723-84F0-B1E4B080DDEC}" type="slidenum">
+              <a:rPr lang="en-US" smtClean="0"/>
+              <a:t>21</a:t>
             </a:fld>
             <a:endParaRPr lang="en-US"/>
           </a:p>
@@ -1441,10 +1679,9 @@
           </a:lstStyle>
           <a:p>
             <a:r>
-              <a:rPr lang="en-US" smtClean="0"/>
+              <a:rPr lang="en-US"/>
               <a:t>Click to edit Master title style</a:t>
             </a:r>
-            <a:endParaRPr lang="en-US"/>
           </a:p>
         </p:txBody>
       </p:sp>
@@ -1506,10 +1743,9 @@
           </a:lstStyle>
           <a:p>
             <a:r>
-              <a:rPr lang="en-US" smtClean="0"/>
+              <a:rPr lang="en-US"/>
               <a:t>Click to edit Master subtitle style</a:t>
             </a:r>
-            <a:endParaRPr lang="en-US"/>
           </a:p>
         </p:txBody>
       </p:sp>
@@ -1530,7 +1766,7 @@
           <a:p>
             <a:fld id="{4263717A-E3C1-4BED-ABE0-B7069385E023}" type="datetimeFigureOut">
               <a:rPr lang="en-US" smtClean="0"/>
-              <a:t>11/9/2020</a:t>
+              <a:t>4/29/2021</a:t>
             </a:fld>
             <a:endParaRPr lang="en-US"/>
           </a:p>
@@ -1629,10 +1865,9 @@
           <a:lstStyle/>
           <a:p>
             <a:r>
-              <a:rPr lang="en-US" smtClean="0"/>
+              <a:rPr lang="en-US"/>
               <a:t>Click to edit Master title style</a:t>
             </a:r>
-            <a:endParaRPr lang="en-US"/>
           </a:p>
         </p:txBody>
       </p:sp>
@@ -1653,38 +1888,37 @@
           <a:p>
             <a:pPr lvl="0"/>
             <a:r>
-              <a:rPr lang="en-US" smtClean="0"/>
+              <a:rPr lang="en-US"/>
               <a:t>Click to edit Master text styles</a:t>
             </a:r>
           </a:p>
           <a:p>
             <a:pPr lvl="1"/>
             <a:r>
-              <a:rPr lang="en-US" smtClean="0"/>
+              <a:rPr lang="en-US"/>
               <a:t>Second level</a:t>
             </a:r>
           </a:p>
           <a:p>
             <a:pPr lvl="2"/>
             <a:r>
-              <a:rPr lang="en-US" smtClean="0"/>
+              <a:rPr lang="en-US"/>
               <a:t>Third level</a:t>
             </a:r>
           </a:p>
           <a:p>
             <a:pPr lvl="3"/>
             <a:r>
-              <a:rPr lang="en-US" smtClean="0"/>
+              <a:rPr lang="en-US"/>
               <a:t>Fourth level</a:t>
             </a:r>
           </a:p>
           <a:p>
             <a:pPr lvl="4"/>
             <a:r>
-              <a:rPr lang="en-US" smtClean="0"/>
+              <a:rPr lang="en-US"/>
               <a:t>Fifth level</a:t>
             </a:r>
-            <a:endParaRPr lang="en-US"/>
           </a:p>
         </p:txBody>
       </p:sp>
@@ -1705,7 +1939,7 @@
           <a:p>
             <a:fld id="{4263717A-E3C1-4BED-ABE0-B7069385E023}" type="datetimeFigureOut">
               <a:rPr lang="en-US" smtClean="0"/>
-              <a:t>11/9/2020</a:t>
+              <a:t>4/29/2021</a:t>
             </a:fld>
             <a:endParaRPr lang="en-US"/>
           </a:p>
@@ -1804,10 +2038,9 @@
           <a:lstStyle/>
           <a:p>
             <a:r>
-              <a:rPr lang="en-US" smtClean="0"/>
+              <a:rPr lang="en-US"/>
               <a:t>Click to edit Master title style</a:t>
             </a:r>
-            <a:endParaRPr lang="en-US"/>
           </a:p>
         </p:txBody>
       </p:sp>
@@ -1833,38 +2066,37 @@
           <a:p>
             <a:pPr lvl="0"/>
             <a:r>
-              <a:rPr lang="en-US" smtClean="0"/>
+              <a:rPr lang="en-US"/>
               <a:t>Click to edit Master text styles</a:t>
             </a:r>
           </a:p>
           <a:p>
             <a:pPr lvl="1"/>
             <a:r>
-              <a:rPr lang="en-US" smtClean="0"/>
+              <a:rPr lang="en-US"/>
               <a:t>Second level</a:t>
             </a:r>
           </a:p>
           <a:p>
             <a:pPr lvl="2"/>
             <a:r>
-              <a:rPr lang="en-US" smtClean="0"/>
+              <a:rPr lang="en-US"/>
               <a:t>Third level</a:t>
             </a:r>
           </a:p>
           <a:p>
             <a:pPr lvl="3"/>
             <a:r>
-              <a:rPr lang="en-US" smtClean="0"/>
+              <a:rPr lang="en-US"/>
               <a:t>Fourth level</a:t>
             </a:r>
           </a:p>
           <a:p>
             <a:pPr lvl="4"/>
             <a:r>
-              <a:rPr lang="en-US" smtClean="0"/>
+              <a:rPr lang="en-US"/>
               <a:t>Fifth level</a:t>
             </a:r>
-            <a:endParaRPr lang="en-US"/>
           </a:p>
         </p:txBody>
       </p:sp>
@@ -1885,7 +2117,7 @@
           <a:p>
             <a:fld id="{4263717A-E3C1-4BED-ABE0-B7069385E023}" type="datetimeFigureOut">
               <a:rPr lang="en-US" smtClean="0"/>
-              <a:t>11/9/2020</a:t>
+              <a:t>4/29/2021</a:t>
             </a:fld>
             <a:endParaRPr lang="en-US"/>
           </a:p>
@@ -1979,10 +2211,9 @@
           <a:lstStyle/>
           <a:p>
             <a:r>
-              <a:rPr lang="en-US" smtClean="0"/>
+              <a:rPr lang="en-US"/>
               <a:t>Click to edit Master title style</a:t>
             </a:r>
-            <a:endParaRPr lang="en-US"/>
           </a:p>
         </p:txBody>
       </p:sp>
@@ -2003,38 +2234,37 @@
           <a:p>
             <a:pPr lvl="0"/>
             <a:r>
-              <a:rPr lang="en-US" smtClean="0"/>
+              <a:rPr lang="en-US"/>
               <a:t>Click to edit Master text styles</a:t>
             </a:r>
           </a:p>
           <a:p>
             <a:pPr lvl="1"/>
             <a:r>
-              <a:rPr lang="en-US" smtClean="0"/>
+              <a:rPr lang="en-US"/>
               <a:t>Second level</a:t>
             </a:r>
           </a:p>
           <a:p>
             <a:pPr lvl="2"/>
             <a:r>
-              <a:rPr lang="en-US" smtClean="0"/>
+              <a:rPr lang="en-US"/>
               <a:t>Third level</a:t>
             </a:r>
           </a:p>
           <a:p>
             <a:pPr lvl="3"/>
             <a:r>
-              <a:rPr lang="en-US" smtClean="0"/>
+              <a:rPr lang="en-US"/>
               <a:t>Fourth level</a:t>
             </a:r>
           </a:p>
           <a:p>
             <a:pPr lvl="4"/>
             <a:r>
-              <a:rPr lang="en-US" smtClean="0"/>
+              <a:rPr lang="en-US"/>
               <a:t>Fifth level</a:t>
             </a:r>
-            <a:endParaRPr lang="en-US"/>
           </a:p>
         </p:txBody>
       </p:sp>
@@ -2055,7 +2285,7 @@
           <a:p>
             <a:fld id="{4263717A-E3C1-4BED-ABE0-B7069385E023}" type="datetimeFigureOut">
               <a:rPr lang="en-US" smtClean="0"/>
-              <a:t>11/9/2020</a:t>
+              <a:t>4/29/2021</a:t>
             </a:fld>
             <a:endParaRPr lang="en-US"/>
           </a:p>
@@ -2158,10 +2388,9 @@
           </a:lstStyle>
           <a:p>
             <a:r>
-              <a:rPr lang="en-US" smtClean="0"/>
+              <a:rPr lang="en-US"/>
               <a:t>Click to edit Master title style</a:t>
             </a:r>
-            <a:endParaRPr lang="en-US"/>
           </a:p>
         </p:txBody>
       </p:sp>
@@ -2278,7 +2507,7 @@
           <a:p>
             <a:pPr lvl="0"/>
             <a:r>
-              <a:rPr lang="en-US" smtClean="0"/>
+              <a:rPr lang="en-US"/>
               <a:t>Click to edit Master text styles</a:t>
             </a:r>
           </a:p>
@@ -2301,7 +2530,7 @@
           <a:p>
             <a:fld id="{4263717A-E3C1-4BED-ABE0-B7069385E023}" type="datetimeFigureOut">
               <a:rPr lang="en-US" smtClean="0"/>
-              <a:t>11/9/2020</a:t>
+              <a:t>4/29/2021</a:t>
             </a:fld>
             <a:endParaRPr lang="en-US"/>
           </a:p>
@@ -2395,10 +2624,9 @@
           <a:lstStyle/>
           <a:p>
             <a:r>
-              <a:rPr lang="en-US" smtClean="0"/>
+              <a:rPr lang="en-US"/>
               <a:t>Click to edit Master title style</a:t>
             </a:r>
-            <a:endParaRPr lang="en-US"/>
           </a:p>
         </p:txBody>
       </p:sp>
@@ -2424,38 +2652,37 @@
           <a:p>
             <a:pPr lvl="0"/>
             <a:r>
-              <a:rPr lang="en-US" smtClean="0"/>
+              <a:rPr lang="en-US"/>
               <a:t>Click to edit Master text styles</a:t>
             </a:r>
           </a:p>
           <a:p>
             <a:pPr lvl="1"/>
             <a:r>
-              <a:rPr lang="en-US" smtClean="0"/>
+              <a:rPr lang="en-US"/>
               <a:t>Second level</a:t>
             </a:r>
           </a:p>
           <a:p>
             <a:pPr lvl="2"/>
             <a:r>
-              <a:rPr lang="en-US" smtClean="0"/>
+              <a:rPr lang="en-US"/>
               <a:t>Third level</a:t>
             </a:r>
           </a:p>
           <a:p>
             <a:pPr lvl="3"/>
             <a:r>
-              <a:rPr lang="en-US" smtClean="0"/>
+              <a:rPr lang="en-US"/>
               <a:t>Fourth level</a:t>
             </a:r>
           </a:p>
           <a:p>
             <a:pPr lvl="4"/>
             <a:r>
-              <a:rPr lang="en-US" smtClean="0"/>
+              <a:rPr lang="en-US"/>
               <a:t>Fifth level</a:t>
             </a:r>
-            <a:endParaRPr lang="en-US"/>
           </a:p>
         </p:txBody>
       </p:sp>
@@ -2481,38 +2708,37 @@
           <a:p>
             <a:pPr lvl="0"/>
             <a:r>
-              <a:rPr lang="en-US" smtClean="0"/>
+              <a:rPr lang="en-US"/>
               <a:t>Click to edit Master text styles</a:t>
             </a:r>
           </a:p>
           <a:p>
             <a:pPr lvl="1"/>
             <a:r>
-              <a:rPr lang="en-US" smtClean="0"/>
+              <a:rPr lang="en-US"/>
               <a:t>Second level</a:t>
             </a:r>
           </a:p>
           <a:p>
             <a:pPr lvl="2"/>
             <a:r>
-              <a:rPr lang="en-US" smtClean="0"/>
+              <a:rPr lang="en-US"/>
               <a:t>Third level</a:t>
             </a:r>
           </a:p>
           <a:p>
             <a:pPr lvl="3"/>
             <a:r>
-              <a:rPr lang="en-US" smtClean="0"/>
+              <a:rPr lang="en-US"/>
               <a:t>Fourth level</a:t>
             </a:r>
           </a:p>
           <a:p>
             <a:pPr lvl="4"/>
             <a:r>
-              <a:rPr lang="en-US" smtClean="0"/>
+              <a:rPr lang="en-US"/>
               <a:t>Fifth level</a:t>
             </a:r>
-            <a:endParaRPr lang="en-US"/>
           </a:p>
         </p:txBody>
       </p:sp>
@@ -2533,7 +2759,7 @@
           <a:p>
             <a:fld id="{4263717A-E3C1-4BED-ABE0-B7069385E023}" type="datetimeFigureOut">
               <a:rPr lang="en-US" smtClean="0"/>
-              <a:t>11/9/2020</a:t>
+              <a:t>4/29/2021</a:t>
             </a:fld>
             <a:endParaRPr lang="en-US"/>
           </a:p>
@@ -2632,10 +2858,9 @@
           <a:lstStyle/>
           <a:p>
             <a:r>
-              <a:rPr lang="en-US" smtClean="0"/>
+              <a:rPr lang="en-US"/>
               <a:t>Click to edit Master title style</a:t>
             </a:r>
-            <a:endParaRPr lang="en-US"/>
           </a:p>
         </p:txBody>
       </p:sp>
@@ -2698,7 +2923,7 @@
           <a:p>
             <a:pPr lvl="0"/>
             <a:r>
-              <a:rPr lang="en-US" smtClean="0"/>
+              <a:rPr lang="en-US"/>
               <a:t>Click to edit Master text styles</a:t>
             </a:r>
           </a:p>
@@ -2726,38 +2951,37 @@
           <a:p>
             <a:pPr lvl="0"/>
             <a:r>
-              <a:rPr lang="en-US" smtClean="0"/>
+              <a:rPr lang="en-US"/>
               <a:t>Click to edit Master text styles</a:t>
             </a:r>
           </a:p>
           <a:p>
             <a:pPr lvl="1"/>
             <a:r>
-              <a:rPr lang="en-US" smtClean="0"/>
+              <a:rPr lang="en-US"/>
               <a:t>Second level</a:t>
             </a:r>
           </a:p>
           <a:p>
             <a:pPr lvl="2"/>
             <a:r>
-              <a:rPr lang="en-US" smtClean="0"/>
+              <a:rPr lang="en-US"/>
               <a:t>Third level</a:t>
             </a:r>
           </a:p>
           <a:p>
             <a:pPr lvl="3"/>
             <a:r>
-              <a:rPr lang="en-US" smtClean="0"/>
+              <a:rPr lang="en-US"/>
               <a:t>Fourth level</a:t>
             </a:r>
           </a:p>
           <a:p>
             <a:pPr lvl="4"/>
             <a:r>
-              <a:rPr lang="en-US" smtClean="0"/>
+              <a:rPr lang="en-US"/>
               <a:t>Fifth level</a:t>
             </a:r>
-            <a:endParaRPr lang="en-US"/>
           </a:p>
         </p:txBody>
       </p:sp>
@@ -2820,7 +3044,7 @@
           <a:p>
             <a:pPr lvl="0"/>
             <a:r>
-              <a:rPr lang="en-US" smtClean="0"/>
+              <a:rPr lang="en-US"/>
               <a:t>Click to edit Master text styles</a:t>
             </a:r>
           </a:p>
@@ -2848,38 +3072,37 @@
           <a:p>
             <a:pPr lvl="0"/>
             <a:r>
-              <a:rPr lang="en-US" smtClean="0"/>
+              <a:rPr lang="en-US"/>
               <a:t>Click to edit Master text styles</a:t>
             </a:r>
           </a:p>
           <a:p>
             <a:pPr lvl="1"/>
             <a:r>
-              <a:rPr lang="en-US" smtClean="0"/>
+              <a:rPr lang="en-US"/>
               <a:t>Second level</a:t>
             </a:r>
           </a:p>
           <a:p>
             <a:pPr lvl="2"/>
             <a:r>
-              <a:rPr lang="en-US" smtClean="0"/>
+              <a:rPr lang="en-US"/>
               <a:t>Third level</a:t>
             </a:r>
           </a:p>
           <a:p>
             <a:pPr lvl="3"/>
             <a:r>
-              <a:rPr lang="en-US" smtClean="0"/>
+              <a:rPr lang="en-US"/>
               <a:t>Fourth level</a:t>
             </a:r>
           </a:p>
           <a:p>
             <a:pPr lvl="4"/>
             <a:r>
-              <a:rPr lang="en-US" smtClean="0"/>
+              <a:rPr lang="en-US"/>
               <a:t>Fifth level</a:t>
             </a:r>
-            <a:endParaRPr lang="en-US"/>
           </a:p>
         </p:txBody>
       </p:sp>
@@ -2900,7 +3123,7 @@
           <a:p>
             <a:fld id="{4263717A-E3C1-4BED-ABE0-B7069385E023}" type="datetimeFigureOut">
               <a:rPr lang="en-US" smtClean="0"/>
-              <a:t>11/9/2020</a:t>
+              <a:t>4/29/2021</a:t>
             </a:fld>
             <a:endParaRPr lang="en-US"/>
           </a:p>
@@ -2994,10 +3217,9 @@
           <a:lstStyle/>
           <a:p>
             <a:r>
-              <a:rPr lang="en-US" smtClean="0"/>
+              <a:rPr lang="en-US"/>
               <a:t>Click to edit Master title style</a:t>
             </a:r>
-            <a:endParaRPr lang="en-US"/>
           </a:p>
         </p:txBody>
       </p:sp>
@@ -3018,7 +3240,7 @@
           <a:p>
             <a:fld id="{4263717A-E3C1-4BED-ABE0-B7069385E023}" type="datetimeFigureOut">
               <a:rPr lang="en-US" smtClean="0"/>
-              <a:t>11/9/2020</a:t>
+              <a:t>4/29/2021</a:t>
             </a:fld>
             <a:endParaRPr lang="en-US"/>
           </a:p>
@@ -3113,7 +3335,7 @@
           <a:p>
             <a:fld id="{4263717A-E3C1-4BED-ABE0-B7069385E023}" type="datetimeFigureOut">
               <a:rPr lang="en-US" smtClean="0"/>
-              <a:t>11/9/2020</a:t>
+              <a:t>4/29/2021</a:t>
             </a:fld>
             <a:endParaRPr lang="en-US"/>
           </a:p>
@@ -3216,10 +3438,9 @@
           </a:lstStyle>
           <a:p>
             <a:r>
-              <a:rPr lang="en-US" smtClean="0"/>
+              <a:rPr lang="en-US"/>
               <a:t>Click to edit Master title style</a:t>
             </a:r>
-            <a:endParaRPr lang="en-US"/>
           </a:p>
         </p:txBody>
       </p:sp>
@@ -3273,38 +3494,37 @@
           <a:p>
             <a:pPr lvl="0"/>
             <a:r>
-              <a:rPr lang="en-US" smtClean="0"/>
+              <a:rPr lang="en-US"/>
               <a:t>Click to edit Master text styles</a:t>
             </a:r>
           </a:p>
           <a:p>
             <a:pPr lvl="1"/>
             <a:r>
-              <a:rPr lang="en-US" smtClean="0"/>
+              <a:rPr lang="en-US"/>
               <a:t>Second level</a:t>
             </a:r>
           </a:p>
           <a:p>
             <a:pPr lvl="2"/>
             <a:r>
-              <a:rPr lang="en-US" smtClean="0"/>
+              <a:rPr lang="en-US"/>
               <a:t>Third level</a:t>
             </a:r>
           </a:p>
           <a:p>
             <a:pPr lvl="3"/>
             <a:r>
-              <a:rPr lang="en-US" smtClean="0"/>
+              <a:rPr lang="en-US"/>
               <a:t>Fourth level</a:t>
             </a:r>
           </a:p>
           <a:p>
             <a:pPr lvl="4"/>
             <a:r>
-              <a:rPr lang="en-US" smtClean="0"/>
+              <a:rPr lang="en-US"/>
               <a:t>Fifth level</a:t>
             </a:r>
-            <a:endParaRPr lang="en-US"/>
           </a:p>
         </p:txBody>
       </p:sp>
@@ -3367,7 +3587,7 @@
           <a:p>
             <a:pPr lvl="0"/>
             <a:r>
-              <a:rPr lang="en-US" smtClean="0"/>
+              <a:rPr lang="en-US"/>
               <a:t>Click to edit Master text styles</a:t>
             </a:r>
           </a:p>
@@ -3390,7 +3610,7 @@
           <a:p>
             <a:fld id="{4263717A-E3C1-4BED-ABE0-B7069385E023}" type="datetimeFigureOut">
               <a:rPr lang="en-US" smtClean="0"/>
-              <a:t>11/9/2020</a:t>
+              <a:t>4/29/2021</a:t>
             </a:fld>
             <a:endParaRPr lang="en-US"/>
           </a:p>
@@ -3493,10 +3713,9 @@
           </a:lstStyle>
           <a:p>
             <a:r>
-              <a:rPr lang="en-US" smtClean="0"/>
+              <a:rPr lang="en-US"/>
               <a:t>Click to edit Master title style</a:t>
             </a:r>
-            <a:endParaRPr lang="en-US"/>
           </a:p>
         </p:txBody>
       </p:sp>
@@ -3620,7 +3839,7 @@
           <a:p>
             <a:pPr lvl="0"/>
             <a:r>
-              <a:rPr lang="en-US" smtClean="0"/>
+              <a:rPr lang="en-US"/>
               <a:t>Click to edit Master text styles</a:t>
             </a:r>
           </a:p>
@@ -3643,7 +3862,7 @@
           <a:p>
             <a:fld id="{4263717A-E3C1-4BED-ABE0-B7069385E023}" type="datetimeFigureOut">
               <a:rPr lang="en-US" smtClean="0"/>
-              <a:t>11/9/2020</a:t>
+              <a:t>4/29/2021</a:t>
             </a:fld>
             <a:endParaRPr lang="en-US"/>
           </a:p>
@@ -3752,10 +3971,9 @@
           <a:lstStyle/>
           <a:p>
             <a:r>
-              <a:rPr lang="en-US" smtClean="0"/>
+              <a:rPr lang="en-US"/>
               <a:t>Click to edit Master title style</a:t>
             </a:r>
-            <a:endParaRPr lang="en-US"/>
           </a:p>
         </p:txBody>
       </p:sp>
@@ -3786,38 +4004,37 @@
           <a:p>
             <a:pPr lvl="0"/>
             <a:r>
-              <a:rPr lang="en-US" smtClean="0"/>
+              <a:rPr lang="en-US"/>
               <a:t>Click to edit Master text styles</a:t>
             </a:r>
           </a:p>
           <a:p>
             <a:pPr lvl="1"/>
             <a:r>
-              <a:rPr lang="en-US" smtClean="0"/>
+              <a:rPr lang="en-US"/>
               <a:t>Second level</a:t>
             </a:r>
           </a:p>
           <a:p>
             <a:pPr lvl="2"/>
             <a:r>
-              <a:rPr lang="en-US" smtClean="0"/>
+              <a:rPr lang="en-US"/>
               <a:t>Third level</a:t>
             </a:r>
           </a:p>
           <a:p>
             <a:pPr lvl="3"/>
             <a:r>
-              <a:rPr lang="en-US" smtClean="0"/>
+              <a:rPr lang="en-US"/>
               <a:t>Fourth level</a:t>
             </a:r>
           </a:p>
           <a:p>
             <a:pPr lvl="4"/>
             <a:r>
-              <a:rPr lang="en-US" smtClean="0"/>
+              <a:rPr lang="en-US"/>
               <a:t>Fifth level</a:t>
             </a:r>
-            <a:endParaRPr lang="en-US"/>
           </a:p>
         </p:txBody>
       </p:sp>
@@ -3856,7 +4073,7 @@
           <a:p>
             <a:fld id="{4263717A-E3C1-4BED-ABE0-B7069385E023}" type="datetimeFigureOut">
               <a:rPr lang="en-US" smtClean="0"/>
-              <a:t>11/9/2020</a:t>
+              <a:t>4/29/2021</a:t>
             </a:fld>
             <a:endParaRPr lang="en-US"/>
           </a:p>
@@ -4441,33 +4658,32 @@
           <a:lstStyle/>
           <a:p>
             <a:r>
-              <a:rPr lang="en-US" dirty="0" smtClean="0"/>
+              <a:rPr lang="en-US" dirty="0"/>
               <a:t>Rhino Hunting – Illegal Possession Investigation</a:t>
             </a:r>
+          </a:p>
+        </p:txBody>
+      </p:sp>
+      <p:sp>
+        <p:nvSpPr>
+          <p:cNvPr id="3" name="Subtitle 2"/>
+          <p:cNvSpPr>
+            <a:spLocks noGrp="1"/>
+          </p:cNvSpPr>
+          <p:nvPr>
+            <p:ph type="subTitle" idx="1"/>
+          </p:nvPr>
+        </p:nvSpPr>
+        <p:spPr/>
+        <p:txBody>
+          <a:bodyPr/>
+          <a:lstStyle/>
+          <a:p>
+            <a:r>
+              <a:rPr lang="en-US"/>
+              <a:t>Steganography</a:t>
+            </a:r>
             <a:endParaRPr lang="en-US" dirty="0"/>
-          </a:p>
-        </p:txBody>
-      </p:sp>
-      <p:sp>
-        <p:nvSpPr>
-          <p:cNvPr id="3" name="Subtitle 2"/>
-          <p:cNvSpPr>
-            <a:spLocks noGrp="1"/>
-          </p:cNvSpPr>
-          <p:nvPr>
-            <p:ph type="subTitle" idx="1"/>
-          </p:nvPr>
-        </p:nvSpPr>
-        <p:spPr/>
-        <p:txBody>
-          <a:bodyPr/>
-          <a:lstStyle/>
-          <a:p>
-            <a:r>
-              <a:rPr lang="en-US" smtClean="0"/>
-              <a:t>Steganography</a:t>
-            </a:r>
-            <a:endParaRPr lang="en-US" dirty="0" smtClean="0"/>
           </a:p>
           <a:p>
             <a:r>
@@ -4532,7 +4748,7 @@
           <a:lstStyle/>
           <a:p>
             <a:r>
-              <a:rPr lang="en-US" dirty="0" smtClean="0">
+              <a:rPr lang="en-US" dirty="0">
                 <a:solidFill>
                   <a:srgbClr val="242729"/>
                 </a:solidFill>
@@ -4619,37 +4835,28 @@
                   <a:schemeClr val="accent5"/>
                 </a:solidFill>
               </a:rPr>
-              <a:t>STEP </a:t>
-            </a:r>
-            <a:r>
-              <a:rPr lang="en-US" dirty="0" smtClean="0">
-                <a:solidFill>
-                  <a:schemeClr val="accent5"/>
-                </a:solidFill>
-              </a:rPr>
-              <a:t>2: </a:t>
-            </a:r>
-            <a:r>
-              <a:rPr lang="en-US" dirty="0" smtClean="0"/>
+              <a:t>STEP 2: </a:t>
+            </a:r>
+            <a:r>
+              <a:rPr lang="en-US" dirty="0"/>
               <a:t>How to use </a:t>
             </a:r>
             <a:r>
-              <a:rPr lang="en-US" dirty="0" err="1" smtClean="0"/>
+              <a:rPr lang="en-US" dirty="0" err="1"/>
               <a:t>stegcrack</a:t>
             </a:r>
             <a:r>
-              <a:rPr lang="en-US" dirty="0" smtClean="0"/>
+              <a:rPr lang="en-US" dirty="0"/>
               <a:t> to find </a:t>
             </a:r>
             <a:r>
-              <a:rPr lang="en-US" dirty="0" err="1" smtClean="0"/>
+              <a:rPr lang="en-US" dirty="0" err="1"/>
               <a:t>jphide</a:t>
             </a:r>
             <a:r>
-              <a:rPr lang="en-US" dirty="0" smtClean="0"/>
+              <a:rPr lang="en-US" dirty="0"/>
               <a:t> passwords?</a:t>
             </a:r>
-            <a:endParaRPr lang="en-US" dirty="0"/>
           </a:p>
         </p:txBody>
       </p:sp>
@@ -4671,121 +4878,99 @@
           <a:lstStyle/>
           <a:p>
             <a:r>
-              <a:rPr lang="en-US" dirty="0" smtClean="0"/>
+              <a:rPr lang="en-US" dirty="0"/>
               <a:t>What  is </a:t>
             </a:r>
             <a:r>
-              <a:rPr lang="en-US" dirty="0" err="1" smtClean="0"/>
+              <a:rPr lang="en-US" dirty="0" err="1"/>
               <a:t>stegbreak</a:t>
             </a:r>
             <a:r>
-              <a:rPr lang="en-US" dirty="0" smtClean="0"/>
+              <a:rPr lang="en-US" dirty="0"/>
               <a:t>?</a:t>
             </a:r>
           </a:p>
           <a:p>
             <a:pPr lvl="1"/>
             <a:r>
-              <a:rPr lang="en-US" dirty="0" smtClean="0"/>
-              <a:t>a </a:t>
-            </a:r>
-            <a:r>
-              <a:rPr lang="en-US" dirty="0"/>
-              <a:t>brute-force dictionary attack </a:t>
-            </a:r>
-            <a:r>
-              <a:rPr lang="en-US" dirty="0" smtClean="0"/>
-              <a:t>on embedded JPG images</a:t>
+              <a:rPr lang="en-US" dirty="0"/>
+              <a:t>a brute-force dictionary attack on embedded JPG images</a:t>
             </a:r>
           </a:p>
           <a:p>
             <a:pPr lvl="1"/>
             <a:r>
-              <a:rPr lang="en-US" dirty="0" smtClean="0"/>
+              <a:rPr lang="en-US" dirty="0"/>
               <a:t>Shipped with </a:t>
             </a:r>
             <a:r>
-              <a:rPr lang="en-US" dirty="0" err="1" smtClean="0"/>
+              <a:rPr lang="en-US" dirty="0" err="1"/>
               <a:t>stegdetect</a:t>
             </a:r>
-            <a:endParaRPr lang="en-US" dirty="0" smtClean="0"/>
+            <a:endParaRPr lang="en-US" dirty="0"/>
           </a:p>
           <a:p>
             <a:r>
               <a:rPr lang="en-US" dirty="0"/>
               <a:t>Target on embedding used by </a:t>
             </a:r>
-            <a:endParaRPr lang="en-US" dirty="0" smtClean="0"/>
           </a:p>
           <a:p>
             <a:pPr lvl="1"/>
             <a:r>
-              <a:rPr lang="en-US" dirty="0" smtClean="0"/>
+              <a:rPr lang="en-US" dirty="0"/>
               <a:t>Outguess</a:t>
             </a:r>
           </a:p>
           <a:p>
             <a:pPr lvl="1"/>
             <a:r>
-              <a:rPr lang="en-US" dirty="0" err="1" smtClean="0"/>
+              <a:rPr lang="en-US" dirty="0" err="1"/>
               <a:t>Jphide</a:t>
             </a:r>
             <a:r>
               <a:rPr lang="en-US" dirty="0"/>
               <a:t>, and </a:t>
             </a:r>
-            <a:endParaRPr lang="en-US" dirty="0" smtClean="0"/>
           </a:p>
           <a:p>
             <a:pPr lvl="1"/>
             <a:r>
-              <a:rPr lang="en-US" dirty="0" err="1" smtClean="0"/>
+              <a:rPr lang="en-US" dirty="0" err="1"/>
               <a:t>steg</a:t>
             </a:r>
             <a:r>
-              <a:rPr lang="en-US" dirty="0" smtClean="0"/>
+              <a:rPr lang="en-US" dirty="0"/>
               <a:t>-shell.</a:t>
             </a:r>
           </a:p>
           <a:p>
             <a:r>
-              <a:rPr lang="en-US" dirty="0" smtClean="0"/>
-              <a:t>Rules </a:t>
-            </a:r>
-            <a:r>
-              <a:rPr lang="en-US" dirty="0"/>
-              <a:t>on how to manipulate words for the dictionary </a:t>
-            </a:r>
-            <a:r>
-              <a:rPr lang="en-US" dirty="0" smtClean="0"/>
-              <a:t>attack</a:t>
+              <a:rPr lang="en-US" dirty="0"/>
+              <a:t>Rules on how to manipulate words for the dictionary attack</a:t>
             </a:r>
           </a:p>
           <a:p>
             <a:pPr lvl="1"/>
             <a:r>
-              <a:rPr lang="en-US" dirty="0" smtClean="0"/>
+              <a:rPr lang="en-US" dirty="0"/>
               <a:t>/</a:t>
             </a:r>
             <a:r>
-              <a:rPr lang="en-US" dirty="0" err="1" smtClean="0"/>
+              <a:rPr lang="en-US" dirty="0" err="1"/>
               <a:t>usr</a:t>
             </a:r>
             <a:r>
-              <a:rPr lang="en-US" dirty="0" smtClean="0"/>
+              <a:rPr lang="en-US" dirty="0"/>
               <a:t>/local/share/</a:t>
             </a:r>
             <a:r>
-              <a:rPr lang="en-US" dirty="0" err="1" smtClean="0"/>
+              <a:rPr lang="en-US" dirty="0" err="1"/>
               <a:t>stegbreak</a:t>
             </a:r>
             <a:r>
-              <a:rPr lang="en-US" dirty="0" smtClean="0"/>
-              <a:t>/rules.ini, </a:t>
-            </a:r>
-            <a:r>
-              <a:rPr lang="en-US" dirty="0"/>
-              <a:t>from John the Ripper.</a:t>
+              <a:rPr lang="en-US" dirty="0"/>
+              <a:t>/rules.ini, from John the Ripper.</a:t>
             </a:r>
           </a:p>
           <a:p>
@@ -4793,7 +4978,7 @@
             <a:endParaRPr lang="en-US" dirty="0"/>
           </a:p>
           <a:p>
-            <a:endParaRPr lang="en-US" dirty="0" smtClean="0"/>
+            <a:endParaRPr lang="en-US" dirty="0"/>
           </a:p>
           <a:p>
             <a:pPr lvl="1"/>
@@ -4910,11 +5095,11 @@
           <a:lstStyle/>
           <a:p>
             <a:r>
-              <a:rPr lang="en-US" sz="2000" dirty="0" smtClean="0"/>
+              <a:rPr lang="en-US" sz="2000" dirty="0"/>
               <a:t>Missing </a:t>
             </a:r>
             <a:r>
-              <a:rPr lang="en-US" sz="2000" i="1" dirty="0" smtClean="0">
+              <a:rPr lang="en-US" sz="2000" i="1" dirty="0">
                 <a:solidFill>
                   <a:srgbClr val="FF0000"/>
                 </a:solidFill>
@@ -4922,11 +5107,11 @@
               <a:t>rules.ini</a:t>
             </a:r>
             <a:r>
-              <a:rPr lang="en-US" sz="2000" dirty="0" smtClean="0"/>
+              <a:rPr lang="en-US" sz="2000" dirty="0"/>
               <a:t> in </a:t>
             </a:r>
             <a:r>
-              <a:rPr lang="en-US" sz="2000" i="1" dirty="0" smtClean="0">
+              <a:rPr lang="en-US" sz="2000" i="1" dirty="0">
                 <a:solidFill>
                   <a:srgbClr val="FF0000"/>
                 </a:solidFill>
@@ -4934,7 +5119,7 @@
               <a:t>/</a:t>
             </a:r>
             <a:r>
-              <a:rPr lang="en-US" sz="2000" i="1" dirty="0" err="1" smtClean="0">
+              <a:rPr lang="en-US" sz="2000" i="1" dirty="0" err="1">
                 <a:solidFill>
                   <a:srgbClr val="FF0000"/>
                 </a:solidFill>
@@ -4942,7 +5127,7 @@
               <a:t>usr</a:t>
             </a:r>
             <a:r>
-              <a:rPr lang="en-US" sz="2000" i="1" dirty="0" smtClean="0">
+              <a:rPr lang="en-US" sz="2000" i="1" dirty="0">
                 <a:solidFill>
                   <a:srgbClr val="FF0000"/>
                 </a:solidFill>
@@ -4950,7 +5135,7 @@
               <a:t>/local/share/</a:t>
             </a:r>
             <a:r>
-              <a:rPr lang="en-US" sz="2000" i="1" dirty="0" err="1" smtClean="0">
+              <a:rPr lang="en-US" sz="2000" i="1" dirty="0" err="1">
                 <a:solidFill>
                   <a:srgbClr val="FF0000"/>
                 </a:solidFill>
@@ -4958,7 +5143,7 @@
               <a:t>stegbreak</a:t>
             </a:r>
             <a:r>
-              <a:rPr lang="en-US" sz="2000" i="1" dirty="0" smtClean="0">
+              <a:rPr lang="en-US" sz="2000" i="1" dirty="0">
                 <a:solidFill>
                   <a:srgbClr val="FF0000"/>
                 </a:solidFill>
@@ -4966,10 +5151,9 @@
               <a:t> </a:t>
             </a:r>
             <a:r>
-              <a:rPr lang="en-US" sz="2000" dirty="0" smtClean="0"/>
+              <a:rPr lang="en-US" sz="2000" dirty="0"/>
               <a:t>folder </a:t>
             </a:r>
-            <a:endParaRPr lang="en-US" sz="2000" dirty="0"/>
           </a:p>
         </p:txBody>
       </p:sp>
@@ -5051,7 +5235,7 @@
           <a:lstStyle/>
           <a:p>
             <a:r>
-              <a:rPr lang="en-US" dirty="0" smtClean="0"/>
+              <a:rPr lang="en-US" dirty="0"/>
               <a:t>Copy </a:t>
             </a:r>
             <a:r>
@@ -5064,11 +5248,7 @@
             </a:r>
             <a:r>
               <a:rPr lang="en-US" dirty="0"/>
-              <a:t> </a:t>
-            </a:r>
-            <a:r>
-              <a:rPr lang="en-US" dirty="0" smtClean="0"/>
-              <a:t>to </a:t>
+              <a:t> to </a:t>
             </a:r>
             <a:r>
               <a:rPr lang="en-US" i="1" dirty="0">
@@ -5219,11 +5399,11 @@
           <a:lstStyle/>
           <a:p>
             <a:r>
-              <a:rPr lang="en-US" dirty="0" smtClean="0"/>
+              <a:rPr lang="en-US" dirty="0"/>
               <a:t>Test </a:t>
             </a:r>
             <a:r>
-              <a:rPr lang="en-US" dirty="0" err="1" smtClean="0"/>
+              <a:rPr lang="en-US" dirty="0" err="1"/>
               <a:t>stegbreak</a:t>
             </a:r>
             <a:endParaRPr lang="en-US" dirty="0"/>
@@ -5255,11 +5435,11 @@
           <a:lstStyle/>
           <a:p>
             <a:r>
-              <a:rPr lang="en-US" dirty="0" smtClean="0"/>
+              <a:rPr lang="en-US" dirty="0"/>
               <a:t>Download wordlist required by </a:t>
             </a:r>
             <a:r>
-              <a:rPr lang="en-US" dirty="0" err="1" smtClean="0"/>
+              <a:rPr lang="en-US" dirty="0" err="1"/>
               <a:t>stegbreak</a:t>
             </a:r>
             <a:endParaRPr lang="en-US" dirty="0"/>
@@ -5314,10 +5494,9 @@
           <a:lstStyle/>
           <a:p>
             <a:r>
-              <a:rPr lang="en-US" dirty="0" smtClean="0"/>
+              <a:rPr lang="en-US" dirty="0"/>
               <a:t>Crack passwords used for hiding photos</a:t>
             </a:r>
-            <a:endParaRPr lang="en-US" dirty="0"/>
           </a:p>
         </p:txBody>
       </p:sp>
@@ -5372,15 +5551,7 @@
                   <a:schemeClr val="accent5"/>
                 </a:solidFill>
               </a:rPr>
-              <a:t>STEP </a:t>
-            </a:r>
-            <a:r>
-              <a:rPr lang="en-US" dirty="0" smtClean="0">
-                <a:solidFill>
-                  <a:schemeClr val="accent5"/>
-                </a:solidFill>
-              </a:rPr>
-              <a:t>3: </a:t>
+              <a:t>STEP 3: </a:t>
             </a:r>
             <a:r>
               <a:rPr lang="en-US" dirty="0"/>
@@ -5477,10 +5648,9 @@
           <a:lstStyle/>
           <a:p>
             <a:r>
-              <a:rPr lang="en-US" dirty="0" smtClean="0"/>
+              <a:rPr lang="en-US" dirty="0"/>
               <a:t>Create working directory</a:t>
             </a:r>
-            <a:endParaRPr lang="en-US" dirty="0"/>
           </a:p>
         </p:txBody>
       </p:sp>
@@ -5509,11 +5679,11 @@
           <a:lstStyle/>
           <a:p>
             <a:r>
-              <a:rPr lang="en-US" dirty="0" smtClean="0"/>
+              <a:rPr lang="en-US" dirty="0"/>
               <a:t>Download and unzip </a:t>
             </a:r>
             <a:r>
-              <a:rPr lang="en-US" dirty="0" err="1" smtClean="0"/>
+              <a:rPr lang="en-US" dirty="0" err="1"/>
               <a:t>jphide</a:t>
             </a:r>
             <a:endParaRPr lang="en-US" dirty="0"/>
@@ -5623,11 +5793,11 @@
           <a:lstStyle/>
           <a:p>
             <a:r>
-              <a:rPr lang="en-US" dirty="0" smtClean="0"/>
+              <a:rPr lang="en-US" dirty="0"/>
               <a:t>Extract the first hidden photo using </a:t>
             </a:r>
             <a:r>
-              <a:rPr lang="en-US" dirty="0" err="1" smtClean="0"/>
+              <a:rPr lang="en-US" dirty="0" err="1"/>
               <a:t>jpseek</a:t>
             </a:r>
             <a:endParaRPr lang="en-US" dirty="0"/>
@@ -5659,10 +5829,9 @@
           <a:lstStyle/>
           <a:p>
             <a:r>
-              <a:rPr lang="en-US" dirty="0" smtClean="0"/>
+              <a:rPr lang="en-US" dirty="0"/>
               <a:t>Display the extract photo </a:t>
             </a:r>
-            <a:endParaRPr lang="en-US" dirty="0"/>
           </a:p>
         </p:txBody>
       </p:sp>
@@ -5719,18 +5888,13 @@
           <a:lstStyle/>
           <a:p>
             <a:r>
-              <a:rPr lang="en-US" sz="4800" b="1" dirty="0" smtClean="0">
+              <a:rPr lang="en-US" sz="4800" b="1" dirty="0">
                 <a:solidFill>
                   <a:srgbClr val="FF0000"/>
                 </a:solidFill>
               </a:rPr>
               <a:t>5</a:t>
             </a:r>
-            <a:endParaRPr lang="en-US" sz="4800" b="1" dirty="0">
-              <a:solidFill>
-                <a:srgbClr val="FF0000"/>
-              </a:solidFill>
-            </a:endParaRPr>
           </a:p>
         </p:txBody>
       </p:sp>
@@ -5762,10 +5926,9 @@
           <a:lstStyle/>
           <a:p>
             <a:r>
-              <a:rPr lang="en-US" dirty="0" smtClean="0"/>
+              <a:rPr lang="en-US" dirty="0"/>
               <a:t>It seems only jpseek.exe (windows version) works</a:t>
             </a:r>
-            <a:endParaRPr lang="en-US" dirty="0"/>
           </a:p>
         </p:txBody>
       </p:sp>
@@ -5823,6 +5986,41 @@
           </a:prstGeom>
         </p:spPr>
       </p:pic>
+      <p:sp>
+        <p:nvSpPr>
+          <p:cNvPr id="12" name="TextBox 11">
+            <a:extLst>
+              <a:ext uri="{FF2B5EF4-FFF2-40B4-BE49-F238E27FC236}">
+                <a16:creationId xmlns:a16="http://schemas.microsoft.com/office/drawing/2014/main" id="{5D400A00-2832-4A43-9AC0-3EBA866BFB4C}"/>
+              </a:ext>
+            </a:extLst>
+          </p:cNvPr>
+          <p:cNvSpPr txBox="1"/>
+          <p:nvPr/>
+        </p:nvSpPr>
+        <p:spPr>
+          <a:xfrm>
+            <a:off x="7343663" y="5779417"/>
+            <a:ext cx="4037201" cy="369332"/>
+          </a:xfrm>
+          <a:prstGeom prst="rect">
+            <a:avLst/>
+          </a:prstGeom>
+          <a:noFill/>
+        </p:spPr>
+        <p:txBody>
+          <a:bodyPr wrap="square">
+            <a:spAutoFit/>
+          </a:bodyPr>
+          <a:lstStyle/>
+          <a:p>
+            <a:r>
+              <a:rPr lang="en-US" dirty="0"/>
+              <a:t>63a39823f80b321c2dcd112158b55011</a:t>
+            </a:r>
+          </a:p>
+        </p:txBody>
+      </p:sp>
     </p:spTree>
     <p:extLst>
       <p:ext uri="{BB962C8B-B14F-4D97-AF65-F5344CB8AC3E}">
@@ -5926,19 +6124,19 @@
           <a:lstStyle/>
           <a:p>
             <a:r>
-              <a:rPr lang="en-US" dirty="0" smtClean="0"/>
+              <a:rPr lang="en-US" dirty="0"/>
               <a:t>Extract </a:t>
             </a:r>
             <a:r>
-              <a:rPr lang="en-US" smtClean="0"/>
+              <a:rPr lang="en-US"/>
               <a:t>the second hidden </a:t>
             </a:r>
             <a:r>
-              <a:rPr lang="en-US" dirty="0" smtClean="0"/>
+              <a:rPr lang="en-US" dirty="0"/>
               <a:t>photo using </a:t>
             </a:r>
             <a:r>
-              <a:rPr lang="en-US" dirty="0" err="1" smtClean="0"/>
+              <a:rPr lang="en-US" dirty="0" err="1"/>
               <a:t>jpseek</a:t>
             </a:r>
             <a:endParaRPr lang="en-US" dirty="0"/>
@@ -5970,10 +6168,9 @@
           <a:lstStyle/>
           <a:p>
             <a:r>
-              <a:rPr lang="en-US" dirty="0" smtClean="0"/>
+              <a:rPr lang="en-US" dirty="0"/>
               <a:t>Display the extract photo </a:t>
             </a:r>
-            <a:endParaRPr lang="en-US" dirty="0"/>
           </a:p>
         </p:txBody>
       </p:sp>
@@ -6030,18 +6227,13 @@
           <a:lstStyle/>
           <a:p>
             <a:r>
-              <a:rPr lang="en-US" sz="4800" b="1" dirty="0" smtClean="0">
+              <a:rPr lang="en-US" sz="4800" b="1" dirty="0">
                 <a:solidFill>
                   <a:srgbClr val="FF0000"/>
                 </a:solidFill>
               </a:rPr>
               <a:t>6</a:t>
             </a:r>
-            <a:endParaRPr lang="en-US" sz="4800" b="1" dirty="0">
-              <a:solidFill>
-                <a:srgbClr val="FF0000"/>
-              </a:solidFill>
-            </a:endParaRPr>
           </a:p>
         </p:txBody>
       </p:sp>
@@ -6099,6 +6291,41 @@
           </a:prstGeom>
         </p:spPr>
       </p:pic>
+      <p:sp>
+        <p:nvSpPr>
+          <p:cNvPr id="11" name="TextBox 10">
+            <a:extLst>
+              <a:ext uri="{FF2B5EF4-FFF2-40B4-BE49-F238E27FC236}">
+                <a16:creationId xmlns:a16="http://schemas.microsoft.com/office/drawing/2014/main" id="{BE527AFF-692A-4C55-B014-2225D3C34EC5}"/>
+              </a:ext>
+            </a:extLst>
+          </p:cNvPr>
+          <p:cNvSpPr txBox="1"/>
+          <p:nvPr/>
+        </p:nvSpPr>
+        <p:spPr>
+          <a:xfrm>
+            <a:off x="7325429" y="5708600"/>
+            <a:ext cx="3995256" cy="369332"/>
+          </a:xfrm>
+          <a:prstGeom prst="rect">
+            <a:avLst/>
+          </a:prstGeom>
+          <a:noFill/>
+        </p:spPr>
+        <p:txBody>
+          <a:bodyPr wrap="square">
+            <a:spAutoFit/>
+          </a:bodyPr>
+          <a:lstStyle/>
+          <a:p>
+            <a:r>
+              <a:rPr lang="en-US" dirty="0"/>
+              <a:t>87018ef0cfdb91e818d92efeb9c19338</a:t>
+            </a:r>
+          </a:p>
+        </p:txBody>
+      </p:sp>
     </p:spTree>
     <p:extLst>
       <p:ext uri="{BB962C8B-B14F-4D97-AF65-F5344CB8AC3E}">
@@ -6131,7 +6358,13 @@
       </p:grpSpPr>
       <p:sp>
         <p:nvSpPr>
-          <p:cNvPr id="2" name="Title 1"/>
+          <p:cNvPr id="4" name="Title 3">
+            <a:extLst>
+              <a:ext uri="{FF2B5EF4-FFF2-40B4-BE49-F238E27FC236}">
+                <a16:creationId xmlns:a16="http://schemas.microsoft.com/office/drawing/2014/main" id="{D14BAF43-1D47-480F-9826-488B646E918B}"/>
+              </a:ext>
+            </a:extLst>
+          </p:cNvPr>
           <p:cNvSpPr>
             <a:spLocks noGrp="1"/>
           </p:cNvSpPr>
@@ -6145,29 +6378,26 @@
           <a:lstStyle/>
           <a:p>
             <a:r>
-              <a:rPr lang="en-US" dirty="0" smtClean="0"/>
-              <a:t>Steg Toolkit - Other </a:t>
-            </a:r>
-            <a:r>
-              <a:rPr lang="en-US" dirty="0"/>
-              <a:t>useful </a:t>
-            </a:r>
-            <a:r>
-              <a:rPr lang="en-US" dirty="0" smtClean="0"/>
-              <a:t>tools collection </a:t>
-            </a:r>
-            <a:endParaRPr lang="en-US" dirty="0"/>
-          </a:p>
-        </p:txBody>
-      </p:sp>
-      <p:sp>
-        <p:nvSpPr>
-          <p:cNvPr id="3" name="Text Placeholder 2"/>
+              <a:rPr lang="en-US" dirty="0"/>
+              <a:t>Evidence</a:t>
+            </a:r>
+          </a:p>
+        </p:txBody>
+      </p:sp>
+      <p:sp>
+        <p:nvSpPr>
+          <p:cNvPr id="5" name="Content Placeholder 4">
+            <a:extLst>
+              <a:ext uri="{FF2B5EF4-FFF2-40B4-BE49-F238E27FC236}">
+                <a16:creationId xmlns:a16="http://schemas.microsoft.com/office/drawing/2014/main" id="{B0B60EF2-6757-465B-B92A-5D06FD527865}"/>
+              </a:ext>
+            </a:extLst>
+          </p:cNvPr>
           <p:cNvSpPr>
             <a:spLocks noGrp="1"/>
           </p:cNvSpPr>
           <p:nvPr>
-            <p:ph type="body" idx="1"/>
+            <p:ph idx="1"/>
           </p:nvPr>
         </p:nvSpPr>
         <p:spPr/>
@@ -6175,14 +6405,92 @@
           <a:bodyPr/>
           <a:lstStyle/>
           <a:p>
-            <a:endParaRPr lang="en-US" dirty="0"/>
+            <a:r>
+              <a:rPr lang="en-GB" dirty="0"/>
+              <a:t> What is the evidence can hep you make decision</a:t>
+            </a:r>
+          </a:p>
+          <a:p>
+            <a:pPr lvl="1"/>
+            <a:r>
+              <a:rPr lang="en-GB" dirty="0"/>
+              <a:t>the suspect hide images</a:t>
+            </a:r>
+          </a:p>
+          <a:p>
+            <a:r>
+              <a:rPr lang="en-GB" dirty="0"/>
+              <a:t>Two tools</a:t>
+            </a:r>
+          </a:p>
+          <a:p>
+            <a:pPr lvl="1"/>
+            <a:r>
+              <a:rPr lang="en-GB" dirty="0" err="1"/>
+              <a:t>stegdetect</a:t>
+            </a:r>
+            <a:endParaRPr lang="en-GB" dirty="0"/>
+          </a:p>
+          <a:p>
+            <a:pPr lvl="1"/>
+            <a:r>
+              <a:rPr lang="en-GB" dirty="0" err="1"/>
+              <a:t>jpseek</a:t>
+            </a:r>
+            <a:r>
+              <a:rPr lang="en-GB" dirty="0"/>
+              <a:t>/</a:t>
+            </a:r>
+            <a:r>
+              <a:rPr lang="en-US" dirty="0" err="1"/>
+              <a:t>stegbreak</a:t>
+            </a:r>
+            <a:r>
+              <a:rPr lang="en-US" dirty="0"/>
+              <a:t> (</a:t>
+            </a:r>
+            <a:r>
+              <a:rPr lang="en-US" dirty="0" err="1"/>
+              <a:t>stegdetec</a:t>
+            </a:r>
+            <a:r>
+              <a:rPr lang="en-US" dirty="0"/>
+              <a:t> and </a:t>
+            </a:r>
+            <a:r>
+              <a:rPr lang="en-US" dirty="0" err="1"/>
+              <a:t>stegbreak</a:t>
+            </a:r>
+            <a:r>
+              <a:rPr lang="en-US" dirty="0"/>
+              <a:t> is the same tool)</a:t>
+            </a:r>
+          </a:p>
+          <a:p>
+            <a:r>
+              <a:rPr lang="en-US" dirty="0"/>
+              <a:t>passwords</a:t>
+            </a:r>
+          </a:p>
+          <a:p>
+            <a:r>
+              <a:rPr lang="en-US" dirty="0"/>
+              <a:t>decoded pictures</a:t>
+            </a:r>
+          </a:p>
+          <a:p>
+            <a:pPr lvl="1"/>
+            <a:r>
+              <a:rPr lang="en-US" dirty="0"/>
+              <a:t>content rhino images</a:t>
+            </a:r>
           </a:p>
         </p:txBody>
       </p:sp>
     </p:spTree>
     <p:extLst>
       <p:ext uri="{BB962C8B-B14F-4D97-AF65-F5344CB8AC3E}">
-        <p14:creationId xmlns:p14="http://schemas.microsoft.com/office/powerpoint/2010/main" val="237911933"/>
+        <p14:creationId xmlns:p14="http://schemas.microsoft.com/office/powerpoint/2010/main" val="650748944"/>
       </p:ext>
     </p:extLst>
   </p:cSld>
@@ -6226,15 +6534,78 @@
           <a:p>
             <a:r>
               <a:rPr lang="en-US" dirty="0"/>
-              <a:t>Any other tools </a:t>
-            </a:r>
-            <a:r>
-              <a:rPr lang="en-US" dirty="0" smtClean="0"/>
-              <a:t>doing steganography</a:t>
-            </a:r>
-            <a:r>
-              <a:rPr lang="en-US" dirty="0"/>
-              <a:t>?</a:t>
+              <a:t>Steg Toolkit - Other useful tools collection </a:t>
+            </a:r>
+          </a:p>
+        </p:txBody>
+      </p:sp>
+      <p:sp>
+        <p:nvSpPr>
+          <p:cNvPr id="3" name="Text Placeholder 2"/>
+          <p:cNvSpPr>
+            <a:spLocks noGrp="1"/>
+          </p:cNvSpPr>
+          <p:nvPr>
+            <p:ph type="body" idx="1"/>
+          </p:nvPr>
+        </p:nvSpPr>
+        <p:spPr/>
+        <p:txBody>
+          <a:bodyPr/>
+          <a:lstStyle/>
+          <a:p>
+            <a:endParaRPr lang="en-US" dirty="0"/>
+          </a:p>
+        </p:txBody>
+      </p:sp>
+    </p:spTree>
+    <p:extLst>
+      <p:ext uri="{BB962C8B-B14F-4D97-AF65-F5344CB8AC3E}">
+        <p14:creationId xmlns:p14="http://schemas.microsoft.com/office/powerpoint/2010/main" val="237911933"/>
+      </p:ext>
+    </p:extLst>
+  </p:cSld>
+  <p:clrMapOvr>
+    <a:masterClrMapping/>
+  </p:clrMapOvr>
+</p:sld>
+</file>
+
+<file path=ppt/slides/slide19.xml><?xml version="1.0" encoding="utf-8"?>
+<p:sld xmlns:a="http://schemas.openxmlformats.org/drawingml/2006/main" xmlns:r="http://schemas.openxmlformats.org/officeDocument/2006/relationships" xmlns:p="http://schemas.openxmlformats.org/presentationml/2006/main">
+  <p:cSld>
+    <p:spTree>
+      <p:nvGrpSpPr>
+        <p:cNvPr id="1" name=""/>
+        <p:cNvGrpSpPr/>
+        <p:nvPr/>
+      </p:nvGrpSpPr>
+      <p:grpSpPr>
+        <a:xfrm>
+          <a:off x="0" y="0"/>
+          <a:ext cx="0" cy="0"/>
+          <a:chOff x="0" y="0"/>
+          <a:chExt cx="0" cy="0"/>
+        </a:xfrm>
+      </p:grpSpPr>
+      <p:sp>
+        <p:nvSpPr>
+          <p:cNvPr id="2" name="Title 1"/>
+          <p:cNvSpPr>
+            <a:spLocks noGrp="1"/>
+          </p:cNvSpPr>
+          <p:nvPr>
+            <p:ph type="title"/>
+          </p:nvPr>
+        </p:nvSpPr>
+        <p:spPr/>
+        <p:txBody>
+          <a:bodyPr/>
+          <a:lstStyle/>
+          <a:p>
+            <a:r>
+              <a:rPr lang="en-US" dirty="0"/>
+              <a:t>Any other tools doing steganography?</a:t>
             </a:r>
           </a:p>
         </p:txBody>
@@ -6264,11 +6635,41 @@
                 <a:tableStyleId>{BDBED569-4797-4DF1-A0F4-6AAB3CD982D8}</a:tableStyleId>
               </a:tblPr>
               <a:tblGrid>
-                <a:gridCol w="1100856"/>
-                <a:gridCol w="1010361"/>
-                <a:gridCol w="4035483"/>
-                <a:gridCol w="2358047"/>
-                <a:gridCol w="2661484"/>
+                <a:gridCol w="1100856">
+                  <a:extLst>
+                    <a:ext uri="{9D8B030D-6E8A-4147-A177-3AD203B41FA5}">
+                      <a16:colId xmlns:a16="http://schemas.microsoft.com/office/drawing/2014/main" val="20000"/>
+                    </a:ext>
+                  </a:extLst>
+                </a:gridCol>
+                <a:gridCol w="1010361">
+                  <a:extLst>
+                    <a:ext uri="{9D8B030D-6E8A-4147-A177-3AD203B41FA5}">
+                      <a16:colId xmlns:a16="http://schemas.microsoft.com/office/drawing/2014/main" val="20001"/>
+                    </a:ext>
+                  </a:extLst>
+                </a:gridCol>
+                <a:gridCol w="4035483">
+                  <a:extLst>
+                    <a:ext uri="{9D8B030D-6E8A-4147-A177-3AD203B41FA5}">
+                      <a16:colId xmlns:a16="http://schemas.microsoft.com/office/drawing/2014/main" val="20002"/>
+                    </a:ext>
+                  </a:extLst>
+                </a:gridCol>
+                <a:gridCol w="2358047">
+                  <a:extLst>
+                    <a:ext uri="{9D8B030D-6E8A-4147-A177-3AD203B41FA5}">
+                      <a16:colId xmlns:a16="http://schemas.microsoft.com/office/drawing/2014/main" val="20003"/>
+                    </a:ext>
+                  </a:extLst>
+                </a:gridCol>
+                <a:gridCol w="2661484">
+                  <a:extLst>
+                    <a:ext uri="{9D8B030D-6E8A-4147-A177-3AD203B41FA5}">
+                      <a16:colId xmlns:a16="http://schemas.microsoft.com/office/drawing/2014/main" val="20004"/>
+                    </a:ext>
+                  </a:extLst>
+                </a:gridCol>
               </a:tblGrid>
               <a:tr h="421075">
                 <a:tc>
@@ -6343,7 +6744,7 @@
                     <a:lstStyle/>
                     <a:p>
                       <a:r>
-                        <a:rPr lang="en-US" sz="1800" b="1" kern="1200" dirty="0" smtClean="0">
+                        <a:rPr lang="en-US" sz="1800" b="1" kern="1200" dirty="0">
                           <a:solidFill>
                             <a:schemeClr val="tx1"/>
                           </a:solidFill>
@@ -6354,19 +6755,15 @@
                         </a:rPr>
                         <a:t>How to recover</a:t>
                       </a:r>
-                      <a:endParaRPr lang="en-US" sz="1800" b="1" kern="1200" dirty="0">
-                        <a:solidFill>
-                          <a:schemeClr val="tx1"/>
-                        </a:solidFill>
-                        <a:effectLst/>
-                        <a:latin typeface="+mn-lt"/>
-                        <a:ea typeface="+mn-ea"/>
-                        <a:cs typeface="+mn-cs"/>
-                      </a:endParaRPr>
                     </a:p>
                   </a:txBody>
                   <a:tcPr marL="42089" marR="42089" marT="19426" marB="19426" anchor="ctr"/>
                 </a:tc>
+                <a:extLst>
+                  <a:ext uri="{0D108BD9-81ED-4DB2-BD59-A6C34878D82A}">
+                    <a16:rowId xmlns:a16="http://schemas.microsoft.com/office/drawing/2014/main" val="10000"/>
+                  </a:ext>
+                </a:extLst>
               </a:tr>
               <a:tr h="893579">
                 <a:tc>
@@ -6375,7 +6772,7 @@
                     <a:lstStyle/>
                     <a:p>
                       <a:r>
-                        <a:rPr lang="en-US" sz="1600" u="none" strike="noStrike" dirty="0" smtClean="0">
+                        <a:rPr lang="en-US" sz="1600" u="none" strike="noStrike" dirty="0">
                           <a:effectLst/>
                           <a:latin typeface="Times New Roman" panose="02020603050405020304" pitchFamily="18" charset="0"/>
                           <a:cs typeface="Times New Roman" panose="02020603050405020304" pitchFamily="18" charset="0"/>
@@ -6524,6 +6921,11 @@
                   </a:txBody>
                   <a:tcPr marL="42089" marR="42089" marT="19426" marB="19426" anchor="ctr"/>
                 </a:tc>
+                <a:extLst>
+                  <a:ext uri="{0D108BD9-81ED-4DB2-BD59-A6C34878D82A}">
+                    <a16:rowId xmlns:a16="http://schemas.microsoft.com/office/drawing/2014/main" val="10001"/>
+                  </a:ext>
+                </a:extLst>
               </a:tr>
               <a:tr h="738173">
                 <a:tc>
@@ -6730,6 +7132,11 @@
                   </a:txBody>
                   <a:tcPr marL="42089" marR="42089" marT="19426" marB="19426" anchor="ctr"/>
                 </a:tc>
+                <a:extLst>
+                  <a:ext uri="{0D108BD9-81ED-4DB2-BD59-A6C34878D82A}">
+                    <a16:rowId xmlns:a16="http://schemas.microsoft.com/office/drawing/2014/main" val="10002"/>
+                  </a:ext>
+                </a:extLst>
               </a:tr>
               <a:tr h="1437495">
                 <a:tc>
@@ -6840,6 +7247,11 @@
                   </a:txBody>
                   <a:tcPr marL="42089" marR="42089" marT="19426" marB="19426" anchor="ctr"/>
                 </a:tc>
+                <a:extLst>
+                  <a:ext uri="{0D108BD9-81ED-4DB2-BD59-A6C34878D82A}">
+                    <a16:rowId xmlns:a16="http://schemas.microsoft.com/office/drawing/2014/main" val="10003"/>
+                  </a:ext>
+                </a:extLst>
               </a:tr>
             </a:tbl>
           </a:graphicData>
@@ -6890,7 +7302,7 @@
 </p:sld>
 </file>
 
-<file path=ppt/slides/slide19.xml><?xml version="1.0" encoding="utf-8"?>
+<file path=ppt/slides/slide2.xml><?xml version="1.0" encoding="utf-8"?>
 <p:sld xmlns:a="http://schemas.openxmlformats.org/drawingml/2006/main" xmlns:r="http://schemas.openxmlformats.org/officeDocument/2006/relationships" xmlns:p="http://schemas.openxmlformats.org/presentationml/2006/main">
   <p:cSld>
     <p:spTree>
@@ -6909,6 +7321,80 @@
       </p:grpSpPr>
       <p:sp>
         <p:nvSpPr>
+          <p:cNvPr id="4" name="Title 3"/>
+          <p:cNvSpPr>
+            <a:spLocks noGrp="1"/>
+          </p:cNvSpPr>
+          <p:nvPr>
+            <p:ph type="title"/>
+          </p:nvPr>
+        </p:nvSpPr>
+        <p:spPr/>
+        <p:txBody>
+          <a:bodyPr/>
+          <a:lstStyle/>
+          <a:p>
+            <a:r>
+              <a:rPr lang="en-US" dirty="0"/>
+              <a:t>Steganography</a:t>
+            </a:r>
+          </a:p>
+        </p:txBody>
+      </p:sp>
+      <p:sp>
+        <p:nvSpPr>
+          <p:cNvPr id="5" name="Text Placeholder 4"/>
+          <p:cNvSpPr>
+            <a:spLocks noGrp="1"/>
+          </p:cNvSpPr>
+          <p:nvPr>
+            <p:ph type="body" idx="1"/>
+          </p:nvPr>
+        </p:nvSpPr>
+        <p:spPr/>
+        <p:txBody>
+          <a:bodyPr/>
+          <a:lstStyle/>
+          <a:p>
+            <a:r>
+              <a:rPr lang="en-US" dirty="0"/>
+              <a:t>Discover hidden rhino photos</a:t>
+            </a:r>
+          </a:p>
+        </p:txBody>
+      </p:sp>
+    </p:spTree>
+    <p:extLst>
+      <p:ext uri="{BB962C8B-B14F-4D97-AF65-F5344CB8AC3E}">
+        <p14:creationId xmlns:p14="http://schemas.microsoft.com/office/powerpoint/2010/main" val="1363319562"/>
+      </p:ext>
+    </p:extLst>
+  </p:cSld>
+  <p:clrMapOvr>
+    <a:masterClrMapping/>
+  </p:clrMapOvr>
+</p:sld>
+</file>
+
+<file path=ppt/slides/slide20.xml><?xml version="1.0" encoding="utf-8"?>
+<p:sld xmlns:a="http://schemas.openxmlformats.org/drawingml/2006/main" xmlns:r="http://schemas.openxmlformats.org/officeDocument/2006/relationships" xmlns:p="http://schemas.openxmlformats.org/presentationml/2006/main">
+  <p:cSld>
+    <p:spTree>
+      <p:nvGrpSpPr>
+        <p:cNvPr id="1" name=""/>
+        <p:cNvGrpSpPr/>
+        <p:nvPr/>
+      </p:nvGrpSpPr>
+      <p:grpSpPr>
+        <a:xfrm>
+          <a:off x="0" y="0"/>
+          <a:ext cx="0" cy="0"/>
+          <a:chOff x="0" y="0"/>
+          <a:chExt cx="0" cy="0"/>
+        </a:xfrm>
+      </p:grpSpPr>
+      <p:sp>
+        <p:nvSpPr>
           <p:cNvPr id="2" name="Title 1"/>
           <p:cNvSpPr>
             <a:spLocks noGrp="1"/>
@@ -6923,18 +7409,9 @@
           <a:lstStyle/>
           <a:p>
             <a:r>
-              <a:rPr lang="en-US" dirty="0" smtClean="0"/>
-              <a:t>Any other tools </a:t>
-            </a:r>
-            <a:r>
-              <a:rPr lang="en-US" dirty="0"/>
-              <a:t>detecting </a:t>
-            </a:r>
-            <a:r>
-              <a:rPr lang="en-US" dirty="0" smtClean="0"/>
-              <a:t>steganography?</a:t>
-            </a:r>
-            <a:endParaRPr lang="en-US" dirty="0"/>
+              <a:rPr lang="en-US" dirty="0"/>
+              <a:t>Any other tools detecting steganography?</a:t>
+            </a:r>
           </a:p>
         </p:txBody>
       </p:sp>
@@ -6963,10 +7440,34 @@
                 <a:tableStyleId>{BDBED569-4797-4DF1-A0F4-6AAB3CD982D8}</a:tableStyleId>
               </a:tblPr>
               <a:tblGrid>
-                <a:gridCol w="1178579"/>
-                <a:gridCol w="1629611"/>
-                <a:gridCol w="4439772"/>
-                <a:gridCol w="3756214"/>
+                <a:gridCol w="1178579">
+                  <a:extLst>
+                    <a:ext uri="{9D8B030D-6E8A-4147-A177-3AD203B41FA5}">
+                      <a16:colId xmlns:a16="http://schemas.microsoft.com/office/drawing/2014/main" val="20000"/>
+                    </a:ext>
+                  </a:extLst>
+                </a:gridCol>
+                <a:gridCol w="1629611">
+                  <a:extLst>
+                    <a:ext uri="{9D8B030D-6E8A-4147-A177-3AD203B41FA5}">
+                      <a16:colId xmlns:a16="http://schemas.microsoft.com/office/drawing/2014/main" val="20001"/>
+                    </a:ext>
+                  </a:extLst>
+                </a:gridCol>
+                <a:gridCol w="4439772">
+                  <a:extLst>
+                    <a:ext uri="{9D8B030D-6E8A-4147-A177-3AD203B41FA5}">
+                      <a16:colId xmlns:a16="http://schemas.microsoft.com/office/drawing/2014/main" val="20002"/>
+                    </a:ext>
+                  </a:extLst>
+                </a:gridCol>
+                <a:gridCol w="3756214">
+                  <a:extLst>
+                    <a:ext uri="{9D8B030D-6E8A-4147-A177-3AD203B41FA5}">
+                      <a16:colId xmlns:a16="http://schemas.microsoft.com/office/drawing/2014/main" val="20003"/>
+                    </a:ext>
+                  </a:extLst>
+                </a:gridCol>
               </a:tblGrid>
               <a:tr h="311827">
                 <a:tc>
@@ -7041,6 +7542,11 @@
                   </a:txBody>
                   <a:tcPr marL="24336" marR="24336" marT="14602" marB="14602" anchor="ctr"/>
                 </a:tc>
+                <a:extLst>
+                  <a:ext uri="{0D108BD9-81ED-4DB2-BD59-A6C34878D82A}">
+                    <a16:rowId xmlns:a16="http://schemas.microsoft.com/office/drawing/2014/main" val="10000"/>
+                  </a:ext>
+                </a:extLst>
               </a:tr>
               <a:tr h="1199746">
                 <a:tc>
@@ -7121,6 +7627,11 @@
                   </a:txBody>
                   <a:tcPr marL="24336" marR="24336" marT="14602" marB="14602" anchor="ctr"/>
                 </a:tc>
+                <a:extLst>
+                  <a:ext uri="{0D108BD9-81ED-4DB2-BD59-A6C34878D82A}">
+                    <a16:rowId xmlns:a16="http://schemas.microsoft.com/office/drawing/2014/main" val="10001"/>
+                  </a:ext>
+                </a:extLst>
               </a:tr>
               <a:tr h="599820">
                 <a:tc>
@@ -7247,6 +7758,11 @@
                   </a:txBody>
                   <a:tcPr marL="24336" marR="24336" marT="14602" marB="14602" anchor="ctr"/>
                 </a:tc>
+                <a:extLst>
+                  <a:ext uri="{0D108BD9-81ED-4DB2-BD59-A6C34878D82A}">
+                    <a16:rowId xmlns:a16="http://schemas.microsoft.com/office/drawing/2014/main" val="10002"/>
+                  </a:ext>
+                </a:extLst>
               </a:tr>
               <a:tr h="1008789">
                 <a:tc>
@@ -7399,6 +7915,11 @@
                   </a:txBody>
                   <a:tcPr marL="24336" marR="24336" marT="14602" marB="14602" anchor="ctr"/>
                 </a:tc>
+                <a:extLst>
+                  <a:ext uri="{0D108BD9-81ED-4DB2-BD59-A6C34878D82A}">
+                    <a16:rowId xmlns:a16="http://schemas.microsoft.com/office/drawing/2014/main" val="10003"/>
+                  </a:ext>
+                </a:extLst>
               </a:tr>
               <a:tr h="484610">
                 <a:tc>
@@ -7548,6 +8069,11 @@
                   </a:txBody>
                   <a:tcPr marL="24336" marR="24336" marT="14602" marB="14602" anchor="ctr"/>
                 </a:tc>
+                <a:extLst>
+                  <a:ext uri="{0D108BD9-81ED-4DB2-BD59-A6C34878D82A}">
+                    <a16:rowId xmlns:a16="http://schemas.microsoft.com/office/drawing/2014/main" val="10004"/>
+                  </a:ext>
+                </a:extLst>
               </a:tr>
             </a:tbl>
           </a:graphicData>
@@ -7566,83 +8092,7 @@
 </p:sld>
 </file>
 
-<file path=ppt/slides/slide2.xml><?xml version="1.0" encoding="utf-8"?>
-<p:sld xmlns:a="http://schemas.openxmlformats.org/drawingml/2006/main" xmlns:r="http://schemas.openxmlformats.org/officeDocument/2006/relationships" xmlns:p="http://schemas.openxmlformats.org/presentationml/2006/main">
-  <p:cSld>
-    <p:spTree>
-      <p:nvGrpSpPr>
-        <p:cNvPr id="1" name=""/>
-        <p:cNvGrpSpPr/>
-        <p:nvPr/>
-      </p:nvGrpSpPr>
-      <p:grpSpPr>
-        <a:xfrm>
-          <a:off x="0" y="0"/>
-          <a:ext cx="0" cy="0"/>
-          <a:chOff x="0" y="0"/>
-          <a:chExt cx="0" cy="0"/>
-        </a:xfrm>
-      </p:grpSpPr>
-      <p:sp>
-        <p:nvSpPr>
-          <p:cNvPr id="4" name="Title 3"/>
-          <p:cNvSpPr>
-            <a:spLocks noGrp="1"/>
-          </p:cNvSpPr>
-          <p:nvPr>
-            <p:ph type="title"/>
-          </p:nvPr>
-        </p:nvSpPr>
-        <p:spPr/>
-        <p:txBody>
-          <a:bodyPr/>
-          <a:lstStyle/>
-          <a:p>
-            <a:r>
-              <a:rPr lang="en-US" dirty="0" smtClean="0"/>
-              <a:t>Steganography</a:t>
-            </a:r>
-            <a:endParaRPr lang="en-US" dirty="0"/>
-          </a:p>
-        </p:txBody>
-      </p:sp>
-      <p:sp>
-        <p:nvSpPr>
-          <p:cNvPr id="5" name="Text Placeholder 4"/>
-          <p:cNvSpPr>
-            <a:spLocks noGrp="1"/>
-          </p:cNvSpPr>
-          <p:nvPr>
-            <p:ph type="body" idx="1"/>
-          </p:nvPr>
-        </p:nvSpPr>
-        <p:spPr/>
-        <p:txBody>
-          <a:bodyPr/>
-          <a:lstStyle/>
-          <a:p>
-            <a:r>
-              <a:rPr lang="en-US" dirty="0" smtClean="0"/>
-              <a:t>Discover hidden rhino photos</a:t>
-            </a:r>
-            <a:endParaRPr lang="en-US" dirty="0"/>
-          </a:p>
-        </p:txBody>
-      </p:sp>
-    </p:spTree>
-    <p:extLst>
-      <p:ext uri="{BB962C8B-B14F-4D97-AF65-F5344CB8AC3E}">
-        <p14:creationId xmlns:p14="http://schemas.microsoft.com/office/powerpoint/2010/main" val="1363319562"/>
-      </p:ext>
-    </p:extLst>
-  </p:cSld>
-  <p:clrMapOvr>
-    <a:masterClrMapping/>
-  </p:clrMapOvr>
-</p:sld>
-</file>
-
-<file path=ppt/slides/slide20.xml><?xml version="1.0" encoding="utf-8"?>
+<file path=ppt/slides/slide21.xml><?xml version="1.0" encoding="utf-8"?>
 <p:sld xmlns:a="http://schemas.openxmlformats.org/drawingml/2006/main" xmlns:r="http://schemas.openxmlformats.org/officeDocument/2006/relationships" xmlns:p="http://schemas.openxmlformats.org/presentationml/2006/main">
   <p:cSld>
     <p:spTree>
@@ -7699,14 +8149,13 @@
           <a:lstStyle/>
           <a:p>
             <a:r>
-              <a:rPr lang="en-US" dirty="0" err="1" smtClean="0"/>
+              <a:rPr lang="en-US" dirty="0" err="1"/>
               <a:t>Stego</a:t>
             </a:r>
             <a:r>
-              <a:rPr lang="en-US" dirty="0" smtClean="0"/>
+              <a:rPr lang="en-US" dirty="0"/>
               <a:t> Toolkit</a:t>
             </a:r>
-            <a:endParaRPr lang="en-US" dirty="0"/>
           </a:p>
         </p:txBody>
       </p:sp>
@@ -7759,10 +8208,9 @@
           <a:lstStyle/>
           <a:p>
             <a:r>
-              <a:rPr lang="en-US" dirty="0" smtClean="0"/>
+              <a:rPr lang="en-US" dirty="0"/>
               <a:t>Download toolkit</a:t>
             </a:r>
-            <a:endParaRPr lang="en-US" dirty="0"/>
           </a:p>
         </p:txBody>
       </p:sp>
@@ -7791,10 +8239,9 @@
           <a:lstStyle/>
           <a:p>
             <a:r>
-              <a:rPr lang="en-US" dirty="0" smtClean="0"/>
+              <a:rPr lang="en-US" dirty="0"/>
               <a:t>List other available tools</a:t>
             </a:r>
-            <a:endParaRPr lang="en-US" dirty="0"/>
           </a:p>
         </p:txBody>
       </p:sp>
@@ -7802,164 +8249,6 @@
     <p:extLst>
       <p:ext uri="{BB962C8B-B14F-4D97-AF65-F5344CB8AC3E}">
         <p14:creationId xmlns:p14="http://schemas.microsoft.com/office/powerpoint/2010/main" val="840527533"/>
-      </p:ext>
-    </p:extLst>
-  </p:cSld>
-  <p:clrMapOvr>
-    <a:masterClrMapping/>
-  </p:clrMapOvr>
-</p:sld>
-</file>
-
-<file path=ppt/slides/slide21.xml><?xml version="1.0" encoding="utf-8"?>
-<p:sld xmlns:a="http://schemas.openxmlformats.org/drawingml/2006/main" xmlns:r="http://schemas.openxmlformats.org/officeDocument/2006/relationships" xmlns:p="http://schemas.openxmlformats.org/presentationml/2006/main">
-  <p:cSld>
-    <p:spTree>
-      <p:nvGrpSpPr>
-        <p:cNvPr id="1" name=""/>
-        <p:cNvGrpSpPr/>
-        <p:nvPr/>
-      </p:nvGrpSpPr>
-      <p:grpSpPr>
-        <a:xfrm>
-          <a:off x="0" y="0"/>
-          <a:ext cx="0" cy="0"/>
-          <a:chOff x="0" y="0"/>
-          <a:chExt cx="0" cy="0"/>
-        </a:xfrm>
-      </p:grpSpPr>
-      <p:pic>
-        <p:nvPicPr>
-          <p:cNvPr id="2" name="Picture 1"/>
-          <p:cNvPicPr>
-            <a:picLocks noChangeAspect="1"/>
-          </p:cNvPicPr>
-          <p:nvPr/>
-        </p:nvPicPr>
-        <p:blipFill>
-          <a:blip r:embed="rId2"/>
-          <a:stretch>
-            <a:fillRect/>
-          </a:stretch>
-        </p:blipFill>
-        <p:spPr>
-          <a:xfrm>
-            <a:off x="1369687" y="851058"/>
-            <a:ext cx="7374819" cy="1447881"/>
-          </a:xfrm>
-          <a:prstGeom prst="rect">
-            <a:avLst/>
-          </a:prstGeom>
-        </p:spPr>
-      </p:pic>
-      <p:pic>
-        <p:nvPicPr>
-          <p:cNvPr id="3" name="Picture 2"/>
-          <p:cNvPicPr>
-            <a:picLocks noChangeAspect="1"/>
-          </p:cNvPicPr>
-          <p:nvPr/>
-        </p:nvPicPr>
-        <p:blipFill>
-          <a:blip r:embed="rId3"/>
-          <a:stretch>
-            <a:fillRect/>
-          </a:stretch>
-        </p:blipFill>
-        <p:spPr>
-          <a:xfrm>
-            <a:off x="1369687" y="2933729"/>
-            <a:ext cx="8541018" cy="3337005"/>
-          </a:xfrm>
-          <a:prstGeom prst="rect">
-            <a:avLst/>
-          </a:prstGeom>
-        </p:spPr>
-      </p:pic>
-      <p:sp>
-        <p:nvSpPr>
-          <p:cNvPr id="4" name="Rectangle 3"/>
-          <p:cNvSpPr/>
-          <p:nvPr/>
-        </p:nvSpPr>
-        <p:spPr>
-          <a:xfrm>
-            <a:off x="1369687" y="481726"/>
-            <a:ext cx="3636765" cy="369332"/>
-          </a:xfrm>
-          <a:prstGeom prst="rect">
-            <a:avLst/>
-          </a:prstGeom>
-          <a:solidFill>
-            <a:srgbClr val="FFC000"/>
-          </a:solidFill>
-        </p:spPr>
-        <p:txBody>
-          <a:bodyPr wrap="none">
-            <a:spAutoFit/>
-          </a:bodyPr>
-          <a:lstStyle/>
-          <a:p>
-            <a:r>
-              <a:rPr lang="en-US" dirty="0" smtClean="0"/>
-              <a:t>Install one of the tools, </a:t>
-            </a:r>
-            <a:r>
-              <a:rPr lang="en-US" dirty="0" err="1" smtClean="0"/>
-              <a:t>jphide</a:t>
-            </a:r>
-            <a:r>
-              <a:rPr lang="en-US" dirty="0" smtClean="0"/>
-              <a:t>/</a:t>
-            </a:r>
-            <a:r>
-              <a:rPr lang="en-US" dirty="0" err="1" smtClean="0"/>
-              <a:t>jpseek</a:t>
-            </a:r>
-            <a:endParaRPr lang="en-US" dirty="0"/>
-          </a:p>
-        </p:txBody>
-      </p:sp>
-      <p:sp>
-        <p:nvSpPr>
-          <p:cNvPr id="5" name="Rectangle 4"/>
-          <p:cNvSpPr/>
-          <p:nvPr/>
-        </p:nvSpPr>
-        <p:spPr>
-          <a:xfrm>
-            <a:off x="1369686" y="2564397"/>
-            <a:ext cx="1109278" cy="369332"/>
-          </a:xfrm>
-          <a:prstGeom prst="rect">
-            <a:avLst/>
-          </a:prstGeom>
-          <a:solidFill>
-            <a:srgbClr val="FFC000"/>
-          </a:solidFill>
-        </p:spPr>
-        <p:txBody>
-          <a:bodyPr wrap="none">
-            <a:spAutoFit/>
-          </a:bodyPr>
-          <a:lstStyle/>
-          <a:p>
-            <a:r>
-              <a:rPr lang="en-US" dirty="0" smtClean="0"/>
-              <a:t>Try </a:t>
-            </a:r>
-            <a:r>
-              <a:rPr lang="en-US" dirty="0" err="1" smtClean="0"/>
-              <a:t>jphide</a:t>
-            </a:r>
-            <a:endParaRPr lang="en-US" dirty="0"/>
-          </a:p>
-        </p:txBody>
-      </p:sp>
-    </p:spTree>
-    <p:extLst>
-      <p:ext uri="{BB962C8B-B14F-4D97-AF65-F5344CB8AC3E}">
-        <p14:creationId xmlns:p14="http://schemas.microsoft.com/office/powerpoint/2010/main" val="1125010384"/>
       </p:ext>
     </p:extLst>
   </p:cSld>
@@ -8002,24 +8291,48 @@
         </p:blipFill>
         <p:spPr>
           <a:xfrm>
-            <a:off x="2979085" y="726358"/>
-            <a:ext cx="8724436" cy="5419565"/>
+            <a:off x="1369687" y="851058"/>
+            <a:ext cx="7374819" cy="1447881"/>
           </a:xfrm>
           <a:prstGeom prst="rect">
             <a:avLst/>
           </a:prstGeom>
         </p:spPr>
       </p:pic>
-      <p:sp>
-        <p:nvSpPr>
-          <p:cNvPr id="3" name="Rectangle 2"/>
+      <p:pic>
+        <p:nvPicPr>
+          <p:cNvPr id="3" name="Picture 2"/>
+          <p:cNvPicPr>
+            <a:picLocks noChangeAspect="1"/>
+          </p:cNvPicPr>
+          <p:nvPr/>
+        </p:nvPicPr>
+        <p:blipFill>
+          <a:blip r:embed="rId3"/>
+          <a:stretch>
+            <a:fillRect/>
+          </a:stretch>
+        </p:blipFill>
+        <p:spPr>
+          <a:xfrm>
+            <a:off x="1369687" y="2933729"/>
+            <a:ext cx="8541018" cy="3337005"/>
+          </a:xfrm>
+          <a:prstGeom prst="rect">
+            <a:avLst/>
+          </a:prstGeom>
+        </p:spPr>
+      </p:pic>
+      <p:sp>
+        <p:nvSpPr>
+          <p:cNvPr id="4" name="Rectangle 3"/>
           <p:cNvSpPr/>
           <p:nvPr/>
         </p:nvSpPr>
         <p:spPr>
           <a:xfrm>
-            <a:off x="333040" y="1141148"/>
-            <a:ext cx="2646045" cy="646331"/>
+            <a:off x="1369687" y="481726"/>
+            <a:ext cx="3636765" cy="369332"/>
           </a:xfrm>
           <a:prstGeom prst="rect">
             <a:avLst/>
@@ -8029,25 +8342,25 @@
           </a:solidFill>
         </p:spPr>
         <p:txBody>
-          <a:bodyPr wrap="square">
+          <a:bodyPr wrap="none">
             <a:spAutoFit/>
           </a:bodyPr>
           <a:lstStyle/>
           <a:p>
             <a:r>
-              <a:rPr lang="en-US" dirty="0" smtClean="0"/>
-              <a:t>Find the location of </a:t>
-            </a:r>
-            <a:r>
-              <a:rPr lang="en-US" dirty="0" err="1" smtClean="0"/>
+              <a:rPr lang="en-US" dirty="0"/>
+              <a:t>Install one of the tools, </a:t>
+            </a:r>
+            <a:r>
+              <a:rPr lang="en-US" dirty="0" err="1"/>
               <a:t>jphide</a:t>
             </a:r>
             <a:r>
-              <a:rPr lang="en-US" dirty="0" smtClean="0"/>
-              <a:t> and </a:t>
-            </a:r>
-            <a:r>
-              <a:rPr lang="en-US" dirty="0" err="1" smtClean="0"/>
+              <a:rPr lang="en-US" dirty="0"/>
+              <a:t>/</a:t>
+            </a:r>
+            <a:r>
+              <a:rPr lang="en-US" dirty="0" err="1"/>
               <a:t>jpseek</a:t>
             </a:r>
             <a:endParaRPr lang="en-US" dirty="0"/>
@@ -8056,14 +8369,14 @@
       </p:sp>
       <p:sp>
         <p:nvSpPr>
-          <p:cNvPr id="4" name="Rectangle 3"/>
+          <p:cNvPr id="5" name="Rectangle 4"/>
           <p:cNvSpPr/>
           <p:nvPr/>
         </p:nvSpPr>
         <p:spPr>
           <a:xfrm>
-            <a:off x="333040" y="2389657"/>
-            <a:ext cx="2646045" cy="369332"/>
+            <a:off x="1369686" y="2564397"/>
+            <a:ext cx="1109278" cy="369332"/>
           </a:xfrm>
           <a:prstGeom prst="rect">
             <a:avLst/>
@@ -8073,18 +8386,18 @@
           </a:solidFill>
         </p:spPr>
         <p:txBody>
-          <a:bodyPr wrap="square">
+          <a:bodyPr wrap="none">
             <a:spAutoFit/>
           </a:bodyPr>
           <a:lstStyle/>
           <a:p>
             <a:r>
-              <a:rPr lang="en-US" dirty="0" smtClean="0"/>
+              <a:rPr lang="en-US" dirty="0"/>
               <a:t>Try </a:t>
             </a:r>
             <a:r>
-              <a:rPr lang="en-US" dirty="0" err="1" smtClean="0"/>
-              <a:t>jpseed</a:t>
+              <a:rPr lang="en-US" dirty="0" err="1"/>
+              <a:t>jphide</a:t>
             </a:r>
             <a:endParaRPr lang="en-US" dirty="0"/>
           </a:p>
@@ -8093,7 +8406,7 @@
     </p:spTree>
     <p:extLst>
       <p:ext uri="{BB962C8B-B14F-4D97-AF65-F5344CB8AC3E}">
-        <p14:creationId xmlns:p14="http://schemas.microsoft.com/office/powerpoint/2010/main" val="3198170303"/>
+        <p14:creationId xmlns:p14="http://schemas.microsoft.com/office/powerpoint/2010/main" val="1125010384"/>
       </p:ext>
     </p:extLst>
   </p:cSld>
@@ -8120,6 +8433,140 @@
           <a:chExt cx="0" cy="0"/>
         </a:xfrm>
       </p:grpSpPr>
+      <p:pic>
+        <p:nvPicPr>
+          <p:cNvPr id="2" name="Picture 1"/>
+          <p:cNvPicPr>
+            <a:picLocks noChangeAspect="1"/>
+          </p:cNvPicPr>
+          <p:nvPr/>
+        </p:nvPicPr>
+        <p:blipFill>
+          <a:blip r:embed="rId2"/>
+          <a:stretch>
+            <a:fillRect/>
+          </a:stretch>
+        </p:blipFill>
+        <p:spPr>
+          <a:xfrm>
+            <a:off x="2979085" y="726358"/>
+            <a:ext cx="8724436" cy="5419565"/>
+          </a:xfrm>
+          <a:prstGeom prst="rect">
+            <a:avLst/>
+          </a:prstGeom>
+        </p:spPr>
+      </p:pic>
+      <p:sp>
+        <p:nvSpPr>
+          <p:cNvPr id="3" name="Rectangle 2"/>
+          <p:cNvSpPr/>
+          <p:nvPr/>
+        </p:nvSpPr>
+        <p:spPr>
+          <a:xfrm>
+            <a:off x="333040" y="1141148"/>
+            <a:ext cx="2646045" cy="646331"/>
+          </a:xfrm>
+          <a:prstGeom prst="rect">
+            <a:avLst/>
+          </a:prstGeom>
+          <a:solidFill>
+            <a:srgbClr val="FFC000"/>
+          </a:solidFill>
+        </p:spPr>
+        <p:txBody>
+          <a:bodyPr wrap="square">
+            <a:spAutoFit/>
+          </a:bodyPr>
+          <a:lstStyle/>
+          <a:p>
+            <a:r>
+              <a:rPr lang="en-US" dirty="0"/>
+              <a:t>Find the location of </a:t>
+            </a:r>
+            <a:r>
+              <a:rPr lang="en-US" dirty="0" err="1"/>
+              <a:t>jphide</a:t>
+            </a:r>
+            <a:r>
+              <a:rPr lang="en-US" dirty="0"/>
+              <a:t> and </a:t>
+            </a:r>
+            <a:r>
+              <a:rPr lang="en-US" dirty="0" err="1"/>
+              <a:t>jpseek</a:t>
+            </a:r>
+            <a:endParaRPr lang="en-US" dirty="0"/>
+          </a:p>
+        </p:txBody>
+      </p:sp>
+      <p:sp>
+        <p:nvSpPr>
+          <p:cNvPr id="4" name="Rectangle 3"/>
+          <p:cNvSpPr/>
+          <p:nvPr/>
+        </p:nvSpPr>
+        <p:spPr>
+          <a:xfrm>
+            <a:off x="333040" y="2389657"/>
+            <a:ext cx="2646045" cy="369332"/>
+          </a:xfrm>
+          <a:prstGeom prst="rect">
+            <a:avLst/>
+          </a:prstGeom>
+          <a:solidFill>
+            <a:srgbClr val="FFC000"/>
+          </a:solidFill>
+        </p:spPr>
+        <p:txBody>
+          <a:bodyPr wrap="square">
+            <a:spAutoFit/>
+          </a:bodyPr>
+          <a:lstStyle/>
+          <a:p>
+            <a:r>
+              <a:rPr lang="en-US" dirty="0"/>
+              <a:t>Try </a:t>
+            </a:r>
+            <a:r>
+              <a:rPr lang="en-US" dirty="0" err="1"/>
+              <a:t>jpseed</a:t>
+            </a:r>
+            <a:endParaRPr lang="en-US" dirty="0"/>
+          </a:p>
+        </p:txBody>
+      </p:sp>
+    </p:spTree>
+    <p:extLst>
+      <p:ext uri="{BB962C8B-B14F-4D97-AF65-F5344CB8AC3E}">
+        <p14:creationId xmlns:p14="http://schemas.microsoft.com/office/powerpoint/2010/main" val="3198170303"/>
+      </p:ext>
+    </p:extLst>
+  </p:cSld>
+  <p:clrMapOvr>
+    <a:masterClrMapping/>
+  </p:clrMapOvr>
+</p:sld>
+</file>
+
+<file path=ppt/slides/slide24.xml><?xml version="1.0" encoding="utf-8"?>
+<p:sld xmlns:a="http://schemas.openxmlformats.org/drawingml/2006/main" xmlns:r="http://schemas.openxmlformats.org/officeDocument/2006/relationships" xmlns:p="http://schemas.openxmlformats.org/presentationml/2006/main">
+  <p:cSld>
+    <p:spTree>
+      <p:nvGrpSpPr>
+        <p:cNvPr id="1" name=""/>
+        <p:cNvGrpSpPr/>
+        <p:nvPr/>
+      </p:nvGrpSpPr>
+      <p:grpSpPr>
+        <a:xfrm>
+          <a:off x="0" y="0"/>
+          <a:ext cx="0" cy="0"/>
+          <a:chOff x="0" y="0"/>
+          <a:chExt cx="0" cy="0"/>
+        </a:xfrm>
+      </p:grpSpPr>
       <p:sp>
         <p:nvSpPr>
           <p:cNvPr id="2" name="Title 1"/>
@@ -8136,10 +8583,9 @@
           <a:lstStyle/>
           <a:p>
             <a:r>
-              <a:rPr lang="en-US" dirty="0" smtClean="0"/>
+              <a:rPr lang="en-US" dirty="0"/>
               <a:t>Practices</a:t>
             </a:r>
-            <a:endParaRPr lang="en-US" dirty="0"/>
           </a:p>
         </p:txBody>
       </p:sp>
@@ -8159,34 +8605,21 @@
           <a:lstStyle/>
           <a:p>
             <a:r>
-              <a:rPr lang="en-US" dirty="0" smtClean="0"/>
+              <a:rPr lang="en-US" dirty="0"/>
               <a:t>Install and try a different tool in Steg-toolkit</a:t>
             </a:r>
           </a:p>
           <a:p>
             <a:r>
-              <a:rPr lang="en-US" dirty="0" smtClean="0"/>
-              <a:t>Install and try </a:t>
-            </a:r>
-            <a:r>
-              <a:rPr lang="en-US" dirty="0"/>
-              <a:t>Foremost </a:t>
-            </a:r>
-            <a:endParaRPr lang="en-US" dirty="0" smtClean="0"/>
+              <a:rPr lang="en-US" dirty="0"/>
+              <a:t>Install and try Foremost </a:t>
+            </a:r>
           </a:p>
           <a:p>
             <a:pPr lvl="1"/>
             <a:r>
-              <a:rPr lang="en-US" dirty="0" smtClean="0"/>
-              <a:t>Foremost </a:t>
-            </a:r>
-            <a:r>
-              <a:rPr lang="en-US" dirty="0"/>
-              <a:t>is a forensic data recovery program for Linux used to recover files using their headers, footers, and data structures through a process known as file </a:t>
-            </a:r>
-            <a:r>
-              <a:rPr lang="en-US" dirty="0" smtClean="0"/>
-              <a:t>carving</a:t>
+              <a:rPr lang="en-US" dirty="0"/>
+              <a:t>Foremost is a forensic data recovery program for Linux used to recover files using their headers, footers, and data structures through a process known as file carving</a:t>
             </a:r>
           </a:p>
           <a:p>
@@ -8198,32 +8631,15 @@
           <a:p>
             <a:pPr lvl="1"/>
             <a:r>
-              <a:rPr lang="en-US" dirty="0" smtClean="0"/>
-              <a:t>The </a:t>
-            </a:r>
-            <a:r>
-              <a:rPr lang="en-US" dirty="0"/>
-              <a:t>first version of Scalpel, released in 2005, </a:t>
-            </a:r>
-            <a:r>
-              <a:rPr lang="en-US" dirty="0" smtClean="0"/>
-              <a:t>was based </a:t>
-            </a:r>
-            <a:r>
-              <a:rPr lang="en-US" dirty="0"/>
-              <a:t>on Foremost 0.69. </a:t>
-            </a:r>
-            <a:endParaRPr lang="en-US" dirty="0" smtClean="0"/>
+              <a:rPr lang="en-US" dirty="0"/>
+              <a:t>The first version of Scalpel, released in 2005, was based on Foremost 0.69. </a:t>
+            </a:r>
           </a:p>
           <a:p>
             <a:pPr lvl="1"/>
             <a:r>
-              <a:rPr lang="en-US" dirty="0" smtClean="0"/>
-              <a:t>The </a:t>
-            </a:r>
-            <a:r>
-              <a:rPr lang="en-US" dirty="0"/>
-              <a:t>newest public release v2.0,</a:t>
+              <a:rPr lang="en-US" dirty="0"/>
+              <a:t>The newest public release v2.0,</a:t>
             </a:r>
           </a:p>
         </p:txBody>
@@ -8274,18 +8690,9 @@
           <a:lstStyle/>
           <a:p>
             <a:r>
-              <a:rPr lang="en-US" dirty="0" smtClean="0"/>
-              <a:t>How to extract hidden </a:t>
-            </a:r>
-            <a:r>
-              <a:rPr lang="en-US" dirty="0"/>
-              <a:t>rhino </a:t>
-            </a:r>
-            <a:r>
-              <a:rPr lang="en-US" dirty="0" smtClean="0"/>
-              <a:t>photos?</a:t>
-            </a:r>
-            <a:endParaRPr lang="en-US" dirty="0"/>
+              <a:rPr lang="en-US" dirty="0"/>
+              <a:t>How to extract hidden rhino photos?</a:t>
+            </a:r>
           </a:p>
         </p:txBody>
       </p:sp>
@@ -8318,7 +8725,7 @@
               <a:t>STEP 1: </a:t>
             </a:r>
             <a:r>
-              <a:rPr lang="en-US" sz="3200" dirty="0" smtClean="0"/>
+              <a:rPr lang="en-US" sz="3200" dirty="0"/>
               <a:t>Detect which tool are used for hiding photos</a:t>
             </a:r>
           </a:p>
@@ -8330,14 +8737,10 @@
             </a:r>
             <a:r>
               <a:rPr lang="en-US" sz="2800" dirty="0"/>
-              <a:t> </a:t>
-            </a:r>
-            <a:r>
-              <a:rPr lang="en-US" sz="2800" dirty="0" smtClean="0"/>
-              <a:t>-&gt; </a:t>
-            </a:r>
-            <a:r>
-              <a:rPr lang="en-US" sz="2800" dirty="0" err="1" smtClean="0">
+              <a:t> -&gt; </a:t>
+            </a:r>
+            <a:r>
+              <a:rPr lang="en-US" sz="2800" dirty="0" err="1">
                 <a:solidFill>
                   <a:schemeClr val="accent5">
                     <a:lumMod val="20000"/>
@@ -8348,7 +8751,7 @@
               <a:t>steghide</a:t>
             </a:r>
             <a:r>
-              <a:rPr lang="en-US" sz="2800" dirty="0" smtClean="0">
+              <a:rPr lang="en-US" sz="2800" dirty="0">
                 <a:solidFill>
                   <a:schemeClr val="accent5">
                     <a:lumMod val="20000"/>
@@ -8364,7 +8767,7 @@
               <a:buNone/>
             </a:pPr>
             <a:r>
-              <a:rPr lang="en-US" sz="3200" dirty="0" smtClean="0">
+              <a:rPr lang="en-US" sz="3200" dirty="0">
                 <a:solidFill>
                   <a:schemeClr val="accent5"/>
                 </a:solidFill>
@@ -8390,16 +8793,15 @@
               <a:rPr lang="en-US" sz="3200" dirty="0"/>
               <a:t>)</a:t>
             </a:r>
-            <a:endParaRPr lang="en-US" sz="3200" dirty="0" smtClean="0"/>
           </a:p>
           <a:p>
             <a:pPr lvl="1"/>
             <a:r>
-              <a:rPr lang="en-US" sz="2800" dirty="0" err="1" smtClean="0"/>
+              <a:rPr lang="en-US" sz="2800" dirty="0" err="1"/>
               <a:t>stegcrack</a:t>
             </a:r>
             <a:r>
-              <a:rPr lang="en-US" sz="2800" dirty="0" smtClean="0"/>
+              <a:rPr lang="en-US" sz="2800" dirty="0"/>
               <a:t> </a:t>
             </a:r>
           </a:p>
@@ -8408,7 +8810,7 @@
               <a:buNone/>
             </a:pPr>
             <a:r>
-              <a:rPr lang="en-US" sz="3200" dirty="0" smtClean="0">
+              <a:rPr lang="en-US" sz="3200" dirty="0">
                 <a:solidFill>
                   <a:schemeClr val="accent5"/>
                 </a:solidFill>
@@ -8416,22 +8818,22 @@
               <a:t>STEP 3: </a:t>
             </a:r>
             <a:r>
-              <a:rPr lang="en-US" sz="3200" dirty="0" smtClean="0"/>
+              <a:rPr lang="en-US" sz="3200" dirty="0"/>
               <a:t>Use the same </a:t>
             </a:r>
             <a:r>
-              <a:rPr lang="en-US" sz="3200" dirty="0" err="1" smtClean="0"/>
+              <a:rPr lang="en-US" sz="3200" dirty="0" err="1"/>
               <a:t>steg</a:t>
             </a:r>
             <a:r>
-              <a:rPr lang="en-US" sz="3200" dirty="0" smtClean="0"/>
+              <a:rPr lang="en-US" sz="3200" dirty="0"/>
               <a:t> tool to recover the photos</a:t>
             </a:r>
           </a:p>
           <a:p>
             <a:pPr lvl="1"/>
             <a:r>
-              <a:rPr lang="en-US" sz="2800" dirty="0" err="1" smtClean="0">
+              <a:rPr lang="en-US" sz="2800" dirty="0" err="1">
                 <a:solidFill>
                   <a:schemeClr val="accent5">
                     <a:lumMod val="20000"/>
@@ -8442,7 +8844,7 @@
               <a:t>steghide</a:t>
             </a:r>
             <a:r>
-              <a:rPr lang="en-US" sz="2800" dirty="0" smtClean="0">
+              <a:rPr lang="en-US" sz="2800" dirty="0">
                 <a:solidFill>
                   <a:schemeClr val="accent5">
                     <a:lumMod val="20000"/>
@@ -8453,7 +8855,7 @@
               <a:t>/</a:t>
             </a:r>
             <a:r>
-              <a:rPr lang="en-US" sz="2800" dirty="0" err="1" smtClean="0">
+              <a:rPr lang="en-US" sz="2800" dirty="0" err="1">
                 <a:solidFill>
                   <a:schemeClr val="accent5">
                     <a:lumMod val="20000"/>
@@ -8529,7 +8931,7 @@
             </a:r>
             <a:r>
               <a:rPr lang="en-US" dirty="0"/>
-              <a:t>Detect which tool are used for hiding photos</a:t>
+              <a:t>Detect which tool is used for hiding photos</a:t>
             </a:r>
           </a:p>
         </p:txBody>
@@ -8552,27 +8954,23 @@
           <a:lstStyle/>
           <a:p>
             <a:r>
-              <a:rPr lang="en-US" dirty="0" smtClean="0"/>
+              <a:rPr lang="en-US" dirty="0"/>
               <a:t>What is </a:t>
             </a:r>
             <a:r>
-              <a:rPr lang="en-US" dirty="0" err="1" smtClean="0"/>
+              <a:rPr lang="en-US" dirty="0" err="1"/>
               <a:t>stegdetect</a:t>
             </a:r>
             <a:r>
-              <a:rPr lang="en-US" dirty="0" smtClean="0"/>
+              <a:rPr lang="en-US" dirty="0"/>
               <a:t>?</a:t>
             </a:r>
           </a:p>
           <a:p>
             <a:pPr lvl="1"/>
             <a:r>
-              <a:rPr lang="en-US" dirty="0" smtClean="0"/>
-              <a:t>It analyses </a:t>
-            </a:r>
-            <a:r>
-              <a:rPr lang="en-US" dirty="0"/>
-              <a:t>image files for </a:t>
+              <a:rPr lang="en-US" dirty="0"/>
+              <a:t>It analyses image files for </a:t>
             </a:r>
             <a:r>
               <a:rPr lang="en-US" dirty="0" err="1"/>
@@ -8582,17 +8980,12 @@
               <a:rPr lang="en-US" dirty="0"/>
               <a:t> content. </a:t>
             </a:r>
-            <a:endParaRPr lang="en-US" dirty="0" smtClean="0"/>
           </a:p>
           <a:p>
             <a:pPr lvl="1"/>
             <a:r>
-              <a:rPr lang="en-US" dirty="0" smtClean="0"/>
-              <a:t>It </a:t>
-            </a:r>
-            <a:r>
-              <a:rPr lang="en-US" dirty="0"/>
-              <a:t>runs statistical tests to determine if </a:t>
+              <a:rPr lang="en-US" dirty="0"/>
+              <a:t>It runs statistical tests to determine if </a:t>
             </a:r>
             <a:r>
               <a:rPr lang="en-US" dirty="0" err="1"/>
@@ -8602,94 +8995,56 @@
               <a:rPr lang="en-US" dirty="0"/>
               <a:t> content is present, </a:t>
             </a:r>
-            <a:endParaRPr lang="en-US" dirty="0" smtClean="0"/>
           </a:p>
           <a:p>
             <a:pPr lvl="1"/>
             <a:r>
-              <a:rPr lang="en-US" dirty="0" smtClean="0"/>
-              <a:t>It tries </a:t>
-            </a:r>
-            <a:r>
-              <a:rPr lang="en-US" dirty="0"/>
-              <a:t>to find the system that has been used to embed the hidden information</a:t>
-            </a:r>
-            <a:r>
-              <a:rPr lang="en-US" dirty="0" smtClean="0"/>
-              <a:t>.</a:t>
-            </a:r>
-          </a:p>
-          <a:p>
-            <a:r>
-              <a:rPr lang="en-US" dirty="0" smtClean="0"/>
-              <a:t>It tests if </a:t>
-            </a:r>
-            <a:r>
-              <a:rPr lang="en-US" dirty="0"/>
-              <a:t>information has been embedded with </a:t>
-            </a:r>
-            <a:endParaRPr lang="en-US" dirty="0" smtClean="0"/>
+              <a:rPr lang="en-US" dirty="0"/>
+              <a:t>It tries to find the system that has been used to embed the hidden information.</a:t>
+            </a:r>
+          </a:p>
+          <a:p>
+            <a:r>
+              <a:rPr lang="en-US" dirty="0"/>
+              <a:t>It tests if information has been embedded with </a:t>
+            </a:r>
           </a:p>
           <a:p>
             <a:pPr lvl="1"/>
             <a:r>
-              <a:rPr lang="en-US" dirty="0" err="1" smtClean="0"/>
+              <a:rPr lang="en-US" dirty="0" err="1"/>
               <a:t>Jsteg</a:t>
             </a:r>
             <a:r>
-              <a:rPr lang="en-US" dirty="0" smtClean="0"/>
+              <a:rPr lang="en-US" dirty="0"/>
               <a:t>, outguess, </a:t>
             </a:r>
             <a:r>
-              <a:rPr lang="en-US" dirty="0" err="1" smtClean="0"/>
+              <a:rPr lang="en-US" dirty="0" err="1"/>
               <a:t>jphide</a:t>
             </a:r>
             <a:r>
-              <a:rPr lang="en-US" dirty="0" smtClean="0"/>
+              <a:rPr lang="en-US" dirty="0"/>
               <a:t>, invisible secrets, F5</a:t>
             </a:r>
           </a:p>
           <a:p>
             <a:r>
-              <a:rPr lang="en-US" dirty="0" smtClean="0"/>
-              <a:t>It </a:t>
-            </a:r>
-            <a:r>
-              <a:rPr lang="en-US" dirty="0"/>
-              <a:t>tests if </a:t>
-            </a:r>
-            <a:r>
-              <a:rPr lang="en-US" dirty="0" smtClean="0"/>
-              <a:t>information </a:t>
-            </a:r>
-            <a:r>
-              <a:rPr lang="en-US" dirty="0"/>
-              <a:t>has been added </a:t>
-            </a:r>
-            <a:r>
-              <a:rPr lang="en-US" dirty="0" smtClean="0"/>
-              <a:t>at </a:t>
-            </a:r>
-            <a:r>
-              <a:rPr lang="en-US" dirty="0"/>
-              <a:t>the end of </a:t>
-            </a:r>
-            <a:r>
-              <a:rPr lang="en-US" dirty="0" smtClean="0"/>
-              <a:t>file</a:t>
+              <a:rPr lang="en-US" dirty="0"/>
+              <a:t>It tests if information has been added at the end of file</a:t>
             </a:r>
           </a:p>
           <a:p>
             <a:pPr lvl="1"/>
             <a:r>
-              <a:rPr lang="en-US" dirty="0" smtClean="0"/>
+              <a:rPr lang="en-US" dirty="0"/>
               <a:t>Camouflage</a:t>
             </a:r>
           </a:p>
           <a:p>
             <a:pPr lvl="1"/>
             <a:r>
-              <a:rPr lang="en-US" dirty="0" err="1" smtClean="0"/>
+              <a:rPr lang="en-US" dirty="0" err="1"/>
               <a:t>appendX</a:t>
             </a:r>
             <a:endParaRPr lang="en-US" dirty="0"/>
@@ -8735,7 +9090,7 @@
           <p:nvPr/>
         </p:nvPicPr>
         <p:blipFill>
-          <a:blip r:embed="rId2"/>
+          <a:blip r:embed="rId3"/>
           <a:stretch>
             <a:fillRect/>
           </a:stretch>
@@ -8759,7 +9114,7 @@
           <p:nvPr/>
         </p:nvPicPr>
         <p:blipFill rotWithShape="1">
-          <a:blip r:embed="rId3"/>
+          <a:blip r:embed="rId4"/>
           <a:srcRect r="2709"/>
           <a:stretch/>
         </p:blipFill>
@@ -8782,14 +9137,14 @@
           <p:nvPr/>
         </p:nvPicPr>
         <p:blipFill>
-          <a:blip r:embed="rId4"/>
+          <a:blip r:embed="rId5"/>
           <a:stretch>
             <a:fillRect/>
           </a:stretch>
         </p:blipFill>
         <p:spPr>
           <a:xfrm>
-            <a:off x="2701323" y="4038648"/>
+            <a:off x="2701323" y="4734935"/>
             <a:ext cx="8787019" cy="1379574"/>
           </a:xfrm>
           <a:prstGeom prst="rect">
@@ -8822,18 +9177,17 @@
           <a:lstStyle/>
           <a:p>
             <a:r>
-              <a:rPr lang="en-US" dirty="0" smtClean="0"/>
+              <a:rPr lang="en-US" dirty="0"/>
               <a:t>Create a </a:t>
             </a:r>
             <a:r>
-              <a:rPr lang="en-US" i="1" dirty="0" err="1" smtClean="0"/>
+              <a:rPr lang="en-US" i="1" dirty="0" err="1"/>
               <a:t>steg</a:t>
             </a:r>
             <a:r>
-              <a:rPr lang="en-US" dirty="0" smtClean="0"/>
+              <a:rPr lang="en-US" dirty="0"/>
               <a:t> folder</a:t>
             </a:r>
-            <a:endParaRPr lang="en-US" dirty="0"/>
           </a:p>
         </p:txBody>
       </p:sp>
@@ -8862,18 +9216,17 @@
           <a:lstStyle/>
           <a:p>
             <a:r>
-              <a:rPr lang="en-US" dirty="0" smtClean="0"/>
+              <a:rPr lang="en-US" dirty="0"/>
               <a:t>Copy 5 non-rhino photos to the </a:t>
             </a:r>
             <a:r>
-              <a:rPr lang="en-US" i="1" dirty="0" err="1" smtClean="0"/>
+              <a:rPr lang="en-US" i="1" dirty="0" err="1"/>
               <a:t>steg</a:t>
             </a:r>
             <a:r>
-              <a:rPr lang="en-US" dirty="0" smtClean="0"/>
+              <a:rPr lang="en-US" dirty="0"/>
               <a:t> folder</a:t>
             </a:r>
-            <a:endParaRPr lang="en-US" dirty="0"/>
           </a:p>
         </p:txBody>
       </p:sp>
@@ -8885,7 +9238,7 @@
         </p:nvSpPr>
         <p:spPr>
           <a:xfrm>
-            <a:off x="689169" y="4038648"/>
+            <a:off x="689169" y="4734935"/>
             <a:ext cx="2012154" cy="646331"/>
           </a:xfrm>
           <a:prstGeom prst="rect">
@@ -8902,18 +9255,17 @@
           <a:lstStyle/>
           <a:p>
             <a:r>
-              <a:rPr lang="en-US" dirty="0" smtClean="0"/>
+              <a:rPr lang="en-US" dirty="0"/>
               <a:t>Navigate to </a:t>
             </a:r>
             <a:r>
-              <a:rPr lang="en-US" dirty="0" err="1" smtClean="0"/>
+              <a:rPr lang="en-US" dirty="0" err="1"/>
               <a:t>steg</a:t>
             </a:r>
             <a:r>
-              <a:rPr lang="en-US" dirty="0" smtClean="0"/>
+              <a:rPr lang="en-US" dirty="0"/>
               <a:t> folder</a:t>
             </a:r>
-            <a:endParaRPr lang="en-US" dirty="0"/>
           </a:p>
         </p:txBody>
       </p:sp>
@@ -8925,7 +9277,7 @@
         </p:nvSpPr>
         <p:spPr>
           <a:xfrm>
-            <a:off x="689169" y="4778587"/>
+            <a:off x="689169" y="5474874"/>
             <a:ext cx="2012154" cy="646331"/>
           </a:xfrm>
           <a:prstGeom prst="rect">
@@ -8942,13 +9294,42 @@
           <a:lstStyle/>
           <a:p>
             <a:r>
-              <a:rPr lang="en-US" dirty="0" smtClean="0"/>
+              <a:rPr lang="en-US" dirty="0"/>
               <a:t>Verify the folder contains 5 photos</a:t>
             </a:r>
-            <a:endParaRPr lang="en-US" dirty="0"/>
-          </a:p>
-        </p:txBody>
-      </p:sp>
+          </a:p>
+        </p:txBody>
+      </p:sp>
+      <p:pic>
+        <p:nvPicPr>
+          <p:cNvPr id="10" name="Picture 9">
+            <a:extLst>
+              <a:ext uri="{FF2B5EF4-FFF2-40B4-BE49-F238E27FC236}">
+                <a16:creationId xmlns:a16="http://schemas.microsoft.com/office/drawing/2014/main" id="{7F12E880-8720-49D0-B45A-A0024F12CB53}"/>
+              </a:ext>
+            </a:extLst>
+          </p:cNvPr>
+          <p:cNvPicPr>
+            <a:picLocks noChangeAspect="1"/>
+          </p:cNvPicPr>
+          <p:nvPr/>
+        </p:nvPicPr>
+        <p:blipFill>
+          <a:blip r:embed="rId6"/>
+          <a:stretch>
+            <a:fillRect/>
+          </a:stretch>
+        </p:blipFill>
+        <p:spPr>
+          <a:xfrm>
+            <a:off x="2701323" y="3966913"/>
+            <a:ext cx="5959356" cy="480102"/>
+          </a:xfrm>
+          <a:prstGeom prst="rect">
+            <a:avLst/>
+          </a:prstGeom>
+        </p:spPr>
+      </p:pic>
     </p:spTree>
     <p:extLst>
       <p:ext uri="{BB962C8B-B14F-4D97-AF65-F5344CB8AC3E}">
@@ -9027,22 +9408,13 @@
           <a:lstStyle/>
           <a:p>
             <a:r>
-              <a:rPr lang="en-US" dirty="0" smtClean="0">
-                <a:solidFill>
-                  <a:srgbClr val="3B4351"/>
-                </a:solidFill>
-                <a:latin typeface="Arial" panose="020B0604020202020204" pitchFamily="34" charset="0"/>
-              </a:rPr>
-              <a:t>View </a:t>
-            </a:r>
-            <a:r>
               <a:rPr lang="en-US" dirty="0">
                 <a:solidFill>
                   <a:srgbClr val="3B4351"/>
                 </a:solidFill>
                 <a:latin typeface="Arial" panose="020B0604020202020204" pitchFamily="34" charset="0"/>
               </a:rPr>
-              <a:t>the metadata of the file</a:t>
+              <a:t>View the metadata of the file</a:t>
             </a:r>
             <a:endParaRPr lang="en-US" dirty="0"/>
           </a:p>
@@ -9137,7 +9509,7 @@
           <a:lstStyle/>
           <a:p>
             <a:r>
-              <a:rPr lang="en-US" dirty="0" smtClean="0">
+              <a:rPr lang="en-US" dirty="0">
                 <a:solidFill>
                   <a:srgbClr val="3B4351"/>
                 </a:solidFill>
@@ -9146,7 +9518,7 @@
               <a:t>Install </a:t>
             </a:r>
             <a:r>
-              <a:rPr lang="en-US" dirty="0" err="1" smtClean="0">
+              <a:rPr lang="en-US" dirty="0" err="1">
                 <a:solidFill>
                   <a:srgbClr val="3B4351"/>
                 </a:solidFill>
@@ -9155,22 +9527,13 @@
               <a:t>exiftool</a:t>
             </a:r>
             <a:r>
-              <a:rPr lang="en-US" dirty="0" smtClean="0">
-                <a:solidFill>
-                  <a:srgbClr val="3B4351"/>
-                </a:solidFill>
-                <a:latin typeface="Arial" panose="020B0604020202020204" pitchFamily="34" charset="0"/>
-              </a:rPr>
-              <a:t> to view metadata </a:t>
-            </a:r>
-            <a:r>
               <a:rPr lang="en-US" dirty="0">
                 <a:solidFill>
                   <a:srgbClr val="3B4351"/>
                 </a:solidFill>
                 <a:latin typeface="Arial" panose="020B0604020202020204" pitchFamily="34" charset="0"/>
               </a:rPr>
-              <a:t>of the file</a:t>
+              <a:t> to view metadata of the file</a:t>
             </a:r>
             <a:endParaRPr lang="en-US" dirty="0"/>
           </a:p>
@@ -9192,10 +9555,9 @@
           <a:lstStyle/>
           <a:p>
             <a:r>
-              <a:rPr lang="en-US" dirty="0" smtClean="0"/>
+              <a:rPr lang="en-US" dirty="0"/>
               <a:t>Any suspicious data in photo metadata?</a:t>
             </a:r>
-            <a:endParaRPr lang="en-US" dirty="0"/>
           </a:p>
         </p:txBody>
       </p:sp>
@@ -9308,16 +9670,7 @@
                 </a:solidFill>
                 <a:latin typeface="Arial" panose="020B0604020202020204" pitchFamily="34" charset="0"/>
               </a:rPr>
-              <a:t>T</a:t>
-            </a:r>
-            <a:r>
-              <a:rPr lang="en-US" dirty="0" smtClean="0">
-                <a:solidFill>
-                  <a:srgbClr val="242729"/>
-                </a:solidFill>
-                <a:latin typeface="Arial" panose="020B0604020202020204" pitchFamily="34" charset="0"/>
-              </a:rPr>
-              <a:t>rigger rebuilds</a:t>
+              <a:t>Trigger rebuilds</a:t>
             </a:r>
             <a:endParaRPr lang="en-US" dirty="0"/>
           </a:p>
@@ -9372,7 +9725,7 @@
           <a:lstStyle/>
           <a:p>
             <a:r>
-              <a:rPr lang="en-US" dirty="0" smtClean="0">
+              <a:rPr lang="en-US" dirty="0">
                 <a:solidFill>
                   <a:srgbClr val="242729"/>
                 </a:solidFill>
@@ -9381,7 +9734,7 @@
               <a:t>Download </a:t>
             </a:r>
             <a:r>
-              <a:rPr lang="en-US" dirty="0" err="1" smtClean="0">
+              <a:rPr lang="en-US" dirty="0" err="1">
                 <a:solidFill>
                   <a:srgbClr val="242729"/>
                 </a:solidFill>
@@ -9390,7 +9743,7 @@
               <a:t>stegdetect</a:t>
             </a:r>
             <a:r>
-              <a:rPr lang="en-US" dirty="0" smtClean="0">
+              <a:rPr lang="en-US" dirty="0">
                 <a:solidFill>
                   <a:srgbClr val="242729"/>
                 </a:solidFill>
@@ -9451,17 +9804,11 @@
               <a:rPr lang="en-US" sz="1600" dirty="0">
                 <a:latin typeface="Roboto"/>
               </a:rPr>
-              <a:t> which is used to create automatically buildable source code for Unix-like </a:t>
-            </a:r>
-            <a:r>
-              <a:rPr lang="en-US" sz="1600" dirty="0" smtClean="0">
-                <a:latin typeface="Roboto"/>
-              </a:rPr>
-              <a:t>systems.</a:t>
-            </a:r>
-          </a:p>
-          <a:p>
-            <a:endParaRPr lang="en-US" sz="1600" dirty="0" smtClean="0">
+              <a:t> which is used to create automatically buildable source code for Unix-like systems.</a:t>
+            </a:r>
+          </a:p>
+          <a:p>
+            <a:endParaRPr lang="en-US" sz="1600" dirty="0">
               <a:latin typeface="Roboto"/>
             </a:endParaRPr>
           </a:p>
@@ -9479,7 +9826,7 @@
               <a:buChar char="•"/>
             </a:pPr>
             <a:r>
-              <a:rPr lang="en-US" sz="1600" i="1" dirty="0" err="1" smtClean="0">
+              <a:rPr lang="en-US" sz="1600" i="1" dirty="0" err="1">
                 <a:solidFill>
                   <a:srgbClr val="7030A0"/>
                 </a:solidFill>
@@ -9492,15 +9839,7 @@
             </a:r>
             <a:r>
               <a:rPr lang="en-US" sz="1600" dirty="0"/>
-              <a:t>hello </a:t>
-            </a:r>
-            <a:r>
-              <a:rPr lang="en-US" sz="1600" dirty="0" smtClean="0"/>
-              <a:t>world source </a:t>
-            </a:r>
-            <a:r>
-              <a:rPr lang="en-US" sz="1600" dirty="0"/>
-              <a:t>code</a:t>
+              <a:t>hello world source code</a:t>
             </a:r>
           </a:p>
           <a:p>
@@ -9530,21 +9869,8 @@
             </a:r>
             <a:r>
               <a:rPr lang="en-US" sz="1600" dirty="0"/>
-              <a:t>Describes configuration </a:t>
-            </a:r>
-            <a:r>
-              <a:rPr lang="en-US" sz="1600" dirty="0" smtClean="0"/>
-              <a:t>required for compile source code, such as </a:t>
-            </a:r>
-            <a:r>
-              <a:rPr lang="en-US" sz="1600" dirty="0"/>
-              <a:t>dependency </a:t>
-            </a:r>
-            <a:r>
-              <a:rPr lang="en-US" sz="1600" dirty="0" smtClean="0"/>
-              <a:t>generation. </a:t>
-            </a:r>
-            <a:endParaRPr lang="en-US" sz="1600" dirty="0"/>
+              <a:t>Describes configuration required for compile source code, such as dependency generation. </a:t>
+            </a:r>
           </a:p>
           <a:p>
             <a:pPr marL="285750" indent="-285750" fontAlgn="base">
@@ -9565,17 +9891,13 @@
             </a:r>
             <a:r>
               <a:rPr lang="en-US" sz="1600" dirty="0"/>
-              <a:t>Describes sources </a:t>
-            </a:r>
-            <a:r>
-              <a:rPr lang="en-US" sz="1600" dirty="0" smtClean="0"/>
-              <a:t>code and compiled name</a:t>
+              <a:t>Describes sources code and compiled name</a:t>
             </a:r>
           </a:p>
           <a:p>
             <a:pPr fontAlgn="base"/>
             <a:r>
-              <a:rPr lang="en-US" sz="1600" b="1" dirty="0" smtClean="0">
+              <a:rPr lang="en-US" sz="1600" b="1" dirty="0">
                 <a:latin typeface="Roboto"/>
               </a:rPr>
               <a:t>Executable generation:</a:t>
@@ -9592,18 +9914,10 @@
                   <a:srgbClr val="C00000"/>
                 </a:solidFill>
               </a:rPr>
-              <a:t>a</a:t>
-            </a:r>
-            <a:r>
-              <a:rPr lang="en-US" sz="1600" i="1" dirty="0" err="1" smtClean="0">
-                <a:solidFill>
-                  <a:srgbClr val="C00000"/>
-                </a:solidFill>
-              </a:rPr>
-              <a:t>utoreconfg</a:t>
-            </a:r>
-            <a:r>
-              <a:rPr lang="en-US" sz="1600" i="1" dirty="0" smtClean="0">
+              <a:t>autoreconfg</a:t>
+            </a:r>
+            <a:r>
+              <a:rPr lang="en-US" sz="1600" i="1" dirty="0">
                 <a:solidFill>
                   <a:srgbClr val="C00000"/>
                 </a:solidFill>
@@ -9611,7 +9925,7 @@
               <a:t> –</a:t>
             </a:r>
             <a:r>
-              <a:rPr lang="en-US" sz="1600" i="1" dirty="0" err="1" smtClean="0">
+              <a:rPr lang="en-US" sz="1600" i="1" dirty="0" err="1">
                 <a:solidFill>
                   <a:srgbClr val="C00000"/>
                 </a:solidFill>
@@ -9619,7 +9933,7 @@
               <a:t>i</a:t>
             </a:r>
             <a:r>
-              <a:rPr lang="en-US" sz="1600" i="1" dirty="0" smtClean="0">
+              <a:rPr lang="en-US" sz="1600" i="1" dirty="0">
                 <a:solidFill>
                   <a:srgbClr val="C00000"/>
                 </a:solidFill>
@@ -9627,7 +9941,7 @@
               <a:t>: </a:t>
             </a:r>
             <a:r>
-              <a:rPr lang="en-US" sz="1600" i="1" dirty="0" smtClean="0"/>
+              <a:rPr lang="en-US" sz="1600" i="1" dirty="0"/>
               <a:t>force to rebuild</a:t>
             </a:r>
           </a:p>
@@ -9637,7 +9951,7 @@
               <a:buChar char="•"/>
             </a:pPr>
             <a:r>
-              <a:rPr lang="en-US" sz="1600" i="1" dirty="0" smtClean="0">
+              <a:rPr lang="en-US" sz="1600" i="1" dirty="0">
                 <a:solidFill>
                   <a:schemeClr val="accent6"/>
                 </a:solidFill>
@@ -9671,11 +9985,11 @@
               <a:t>make</a:t>
             </a:r>
             <a:r>
-              <a:rPr lang="en-US" sz="1600" i="1" dirty="0" smtClean="0"/>
+              <a:rPr lang="en-US" sz="1600" i="1" dirty="0"/>
               <a:t> -</a:t>
             </a:r>
             <a:r>
-              <a:rPr lang="en-US" sz="1600" dirty="0" smtClean="0"/>
+              <a:rPr lang="en-US" sz="1600" dirty="0"/>
               <a:t>&gt; </a:t>
             </a:r>
             <a:r>
@@ -9686,16 +10000,11 @@
               </a:rPr>
               <a:t>Makefile.am </a:t>
             </a:r>
-            <a:endParaRPr lang="en-US" sz="1600" i="1" dirty="0" smtClean="0">
-              <a:solidFill>
-                <a:schemeClr val="accent1"/>
-              </a:solidFill>
-            </a:endParaRPr>
           </a:p>
           <a:p>
             <a:pPr fontAlgn="base"/>
             <a:r>
-              <a:rPr lang="en-US" sz="1600" b="1" dirty="0" smtClean="0">
+              <a:rPr lang="en-US" sz="1600" b="1" dirty="0">
                 <a:latin typeface="Roboto"/>
               </a:rPr>
               <a:t>Results: </a:t>
@@ -9824,7 +10133,7 @@
           <a:lstStyle/>
           <a:p>
             <a:r>
-              <a:rPr lang="en-US" dirty="0" smtClean="0">
+              <a:rPr lang="en-US" dirty="0">
                 <a:solidFill>
                   <a:srgbClr val="242729"/>
                 </a:solidFill>
@@ -9861,7 +10170,7 @@
           <a:lstStyle/>
           <a:p>
             <a:r>
-              <a:rPr lang="en-US" dirty="0" smtClean="0">
+              <a:rPr lang="en-US" dirty="0">
                 <a:solidFill>
                   <a:srgbClr val="242729"/>
                 </a:solidFill>
@@ -9870,7 +10179,7 @@
               <a:t>Compile source code to </a:t>
             </a:r>
             <a:r>
-              <a:rPr lang="en-US" dirty="0" err="1" smtClean="0">
+              <a:rPr lang="en-US" dirty="0" err="1">
                 <a:solidFill>
                   <a:srgbClr val="242729"/>
                 </a:solidFill>
@@ -9879,7 +10188,7 @@
               <a:t>stegdetect</a:t>
             </a:r>
             <a:r>
-              <a:rPr lang="en-US" dirty="0" smtClean="0">
+              <a:rPr lang="en-US" dirty="0">
                 <a:solidFill>
                   <a:srgbClr val="242729"/>
                 </a:solidFill>
@@ -9994,7 +10303,7 @@
           <a:lstStyle/>
           <a:p>
             <a:r>
-              <a:rPr lang="en-US" dirty="0" err="1" smtClean="0">
+              <a:rPr lang="en-US" dirty="0" err="1">
                 <a:solidFill>
                   <a:srgbClr val="242729"/>
                 </a:solidFill>
@@ -10003,7 +10312,7 @@
               <a:t>Verfiy</a:t>
             </a:r>
             <a:r>
-              <a:rPr lang="en-US" dirty="0" smtClean="0">
+              <a:rPr lang="en-US" dirty="0">
                 <a:solidFill>
                   <a:srgbClr val="242729"/>
                 </a:solidFill>
@@ -10012,7 +10321,7 @@
               <a:t> </a:t>
             </a:r>
             <a:r>
-              <a:rPr lang="en-US" dirty="0" err="1" smtClean="0">
+              <a:rPr lang="en-US" dirty="0" err="1">
                 <a:solidFill>
                   <a:srgbClr val="242729"/>
                 </a:solidFill>
@@ -10021,7 +10330,7 @@
               <a:t>stegdetect</a:t>
             </a:r>
             <a:r>
-              <a:rPr lang="en-US" dirty="0" smtClean="0">
+              <a:rPr lang="en-US" dirty="0">
                 <a:solidFill>
                   <a:srgbClr val="242729"/>
                 </a:solidFill>
@@ -10058,7 +10367,7 @@
           <a:lstStyle/>
           <a:p>
             <a:r>
-              <a:rPr lang="en-US" dirty="0" smtClean="0">
+              <a:rPr lang="en-US" dirty="0">
                 <a:solidFill>
                   <a:srgbClr val="242729"/>
                 </a:solidFill>

</xml_diff>